<commit_message>
Update requirements + notebook 4
</commit_message>
<xml_diff>
--- a/reports/dEEGtal interview presentation - Jeroen Buil.pptx
+++ b/reports/dEEGtal interview presentation - Jeroen Buil.pptx
@@ -137,7 +137,7 @@
   </p:defaultTextStyle>
   <p:extLst>
     <p:ext uri="{EFAFB233-063F-42B5-8137-9DF3F51BA10A}">
-      <p15:sldGuideLst xmlns:p15="http://schemas.microsoft.com/office/powerpoint/2012/main"/>
+      <p15:sldGuideLst xmlns:p15="http://schemas.microsoft.com/office/powerpoint/2012/main" xmlns=""/>
     </p:ext>
   </p:extLst>
 </p:presentation>
@@ -165,7 +165,7 @@
           <p:cNvPr id="2" name="Title 1">
             <a:extLst>
               <a:ext uri="{FF2B5EF4-FFF2-40B4-BE49-F238E27FC236}">
-                <a16:creationId xmlns:a16="http://schemas.microsoft.com/office/drawing/2014/main" id="{B7CABF06-F02D-E522-538F-87D0C055B9DC}"/>
+                <a16:creationId xmlns:a16="http://schemas.microsoft.com/office/drawing/2014/main" xmlns="" id="{B7CABF06-F02D-E522-538F-87D0C055B9DC}"/>
               </a:ext>
             </a:extLst>
           </p:cNvPr>
@@ -203,7 +203,7 @@
           <p:cNvPr id="3" name="Subtitle 2">
             <a:extLst>
               <a:ext uri="{FF2B5EF4-FFF2-40B4-BE49-F238E27FC236}">
-                <a16:creationId xmlns:a16="http://schemas.microsoft.com/office/drawing/2014/main" id="{0EFF16F4-25D2-3214-5873-CEEBDEE67646}"/>
+                <a16:creationId xmlns:a16="http://schemas.microsoft.com/office/drawing/2014/main" xmlns="" id="{0EFF16F4-25D2-3214-5873-CEEBDEE67646}"/>
               </a:ext>
             </a:extLst>
           </p:cNvPr>
@@ -274,7 +274,7 @@
           <p:cNvPr id="4" name="Date Placeholder 3">
             <a:extLst>
               <a:ext uri="{FF2B5EF4-FFF2-40B4-BE49-F238E27FC236}">
-                <a16:creationId xmlns:a16="http://schemas.microsoft.com/office/drawing/2014/main" id="{6E389284-054B-9A61-9535-ECDC53043BE8}"/>
+                <a16:creationId xmlns:a16="http://schemas.microsoft.com/office/drawing/2014/main" xmlns="" id="{6E389284-054B-9A61-9535-ECDC53043BE8}"/>
               </a:ext>
             </a:extLst>
           </p:cNvPr>
@@ -303,7 +303,7 @@
           <p:cNvPr id="5" name="Footer Placeholder 4">
             <a:extLst>
               <a:ext uri="{FF2B5EF4-FFF2-40B4-BE49-F238E27FC236}">
-                <a16:creationId xmlns:a16="http://schemas.microsoft.com/office/drawing/2014/main" id="{0DE34571-CB52-1928-AE6D-61AC1DFFE3C7}"/>
+                <a16:creationId xmlns:a16="http://schemas.microsoft.com/office/drawing/2014/main" xmlns="" id="{0DE34571-CB52-1928-AE6D-61AC1DFFE3C7}"/>
               </a:ext>
             </a:extLst>
           </p:cNvPr>
@@ -328,7 +328,7 @@
           <p:cNvPr id="6" name="Slide Number Placeholder 5">
             <a:extLst>
               <a:ext uri="{FF2B5EF4-FFF2-40B4-BE49-F238E27FC236}">
-                <a16:creationId xmlns:a16="http://schemas.microsoft.com/office/drawing/2014/main" id="{9E15504F-9C41-0F99-54C5-22E6AE47548A}"/>
+                <a16:creationId xmlns:a16="http://schemas.microsoft.com/office/drawing/2014/main" xmlns="" id="{9E15504F-9C41-0F99-54C5-22E6AE47548A}"/>
               </a:ext>
             </a:extLst>
           </p:cNvPr>
@@ -387,7 +387,7 @@
           <p:cNvPr id="2" name="Title 1">
             <a:extLst>
               <a:ext uri="{FF2B5EF4-FFF2-40B4-BE49-F238E27FC236}">
-                <a16:creationId xmlns:a16="http://schemas.microsoft.com/office/drawing/2014/main" id="{D9CE6AEA-7919-5D35-FD68-903DD814CE24}"/>
+                <a16:creationId xmlns:a16="http://schemas.microsoft.com/office/drawing/2014/main" xmlns="" id="{D9CE6AEA-7919-5D35-FD68-903DD814CE24}"/>
               </a:ext>
             </a:extLst>
           </p:cNvPr>
@@ -416,7 +416,7 @@
           <p:cNvPr id="3" name="Vertical Text Placeholder 2">
             <a:extLst>
               <a:ext uri="{FF2B5EF4-FFF2-40B4-BE49-F238E27FC236}">
-                <a16:creationId xmlns:a16="http://schemas.microsoft.com/office/drawing/2014/main" id="{CF00DA63-E80D-4505-2F2B-9A06E9A773F7}"/>
+                <a16:creationId xmlns:a16="http://schemas.microsoft.com/office/drawing/2014/main" xmlns="" id="{CF00DA63-E80D-4505-2F2B-9A06E9A773F7}"/>
               </a:ext>
             </a:extLst>
           </p:cNvPr>
@@ -474,7 +474,7 @@
           <p:cNvPr id="4" name="Date Placeholder 3">
             <a:extLst>
               <a:ext uri="{FF2B5EF4-FFF2-40B4-BE49-F238E27FC236}">
-                <a16:creationId xmlns:a16="http://schemas.microsoft.com/office/drawing/2014/main" id="{3B27C4BA-F111-3DEF-9818-BD01EB86AFBE}"/>
+                <a16:creationId xmlns:a16="http://schemas.microsoft.com/office/drawing/2014/main" xmlns="" id="{3B27C4BA-F111-3DEF-9818-BD01EB86AFBE}"/>
               </a:ext>
             </a:extLst>
           </p:cNvPr>
@@ -503,7 +503,7 @@
           <p:cNvPr id="5" name="Footer Placeholder 4">
             <a:extLst>
               <a:ext uri="{FF2B5EF4-FFF2-40B4-BE49-F238E27FC236}">
-                <a16:creationId xmlns:a16="http://schemas.microsoft.com/office/drawing/2014/main" id="{01EFB961-A2D3-CA48-08D9-0AB0A2A80895}"/>
+                <a16:creationId xmlns:a16="http://schemas.microsoft.com/office/drawing/2014/main" xmlns="" id="{01EFB961-A2D3-CA48-08D9-0AB0A2A80895}"/>
               </a:ext>
             </a:extLst>
           </p:cNvPr>
@@ -528,7 +528,7 @@
           <p:cNvPr id="6" name="Slide Number Placeholder 5">
             <a:extLst>
               <a:ext uri="{FF2B5EF4-FFF2-40B4-BE49-F238E27FC236}">
-                <a16:creationId xmlns:a16="http://schemas.microsoft.com/office/drawing/2014/main" id="{DAA4FFA6-AF31-0EF3-B954-CB3152D5C790}"/>
+                <a16:creationId xmlns:a16="http://schemas.microsoft.com/office/drawing/2014/main" xmlns="" id="{DAA4FFA6-AF31-0EF3-B954-CB3152D5C790}"/>
               </a:ext>
             </a:extLst>
           </p:cNvPr>
@@ -587,7 +587,7 @@
           <p:cNvPr id="2" name="Vertical Title 1">
             <a:extLst>
               <a:ext uri="{FF2B5EF4-FFF2-40B4-BE49-F238E27FC236}">
-                <a16:creationId xmlns:a16="http://schemas.microsoft.com/office/drawing/2014/main" id="{36291ED4-329B-D730-5FD9-647C7D11BD0C}"/>
+                <a16:creationId xmlns:a16="http://schemas.microsoft.com/office/drawing/2014/main" xmlns="" id="{36291ED4-329B-D730-5FD9-647C7D11BD0C}"/>
               </a:ext>
             </a:extLst>
           </p:cNvPr>
@@ -621,7 +621,7 @@
           <p:cNvPr id="3" name="Vertical Text Placeholder 2">
             <a:extLst>
               <a:ext uri="{FF2B5EF4-FFF2-40B4-BE49-F238E27FC236}">
-                <a16:creationId xmlns:a16="http://schemas.microsoft.com/office/drawing/2014/main" id="{1C1B696A-A7D6-E98A-3E69-FCA44E5B9EA3}"/>
+                <a16:creationId xmlns:a16="http://schemas.microsoft.com/office/drawing/2014/main" xmlns="" id="{1C1B696A-A7D6-E98A-3E69-FCA44E5B9EA3}"/>
               </a:ext>
             </a:extLst>
           </p:cNvPr>
@@ -684,7 +684,7 @@
           <p:cNvPr id="4" name="Date Placeholder 3">
             <a:extLst>
               <a:ext uri="{FF2B5EF4-FFF2-40B4-BE49-F238E27FC236}">
-                <a16:creationId xmlns:a16="http://schemas.microsoft.com/office/drawing/2014/main" id="{21123366-7F5A-EA10-7F6C-A42FD4798681}"/>
+                <a16:creationId xmlns:a16="http://schemas.microsoft.com/office/drawing/2014/main" xmlns="" id="{21123366-7F5A-EA10-7F6C-A42FD4798681}"/>
               </a:ext>
             </a:extLst>
           </p:cNvPr>
@@ -713,7 +713,7 @@
           <p:cNvPr id="5" name="Footer Placeholder 4">
             <a:extLst>
               <a:ext uri="{FF2B5EF4-FFF2-40B4-BE49-F238E27FC236}">
-                <a16:creationId xmlns:a16="http://schemas.microsoft.com/office/drawing/2014/main" id="{E7CBDEBF-F607-200C-6FB7-89FD71354564}"/>
+                <a16:creationId xmlns:a16="http://schemas.microsoft.com/office/drawing/2014/main" xmlns="" id="{E7CBDEBF-F607-200C-6FB7-89FD71354564}"/>
               </a:ext>
             </a:extLst>
           </p:cNvPr>
@@ -738,7 +738,7 @@
           <p:cNvPr id="6" name="Slide Number Placeholder 5">
             <a:extLst>
               <a:ext uri="{FF2B5EF4-FFF2-40B4-BE49-F238E27FC236}">
-                <a16:creationId xmlns:a16="http://schemas.microsoft.com/office/drawing/2014/main" id="{F1D11D86-C725-AFA5-C232-B72109276712}"/>
+                <a16:creationId xmlns:a16="http://schemas.microsoft.com/office/drawing/2014/main" xmlns="" id="{F1D11D86-C725-AFA5-C232-B72109276712}"/>
               </a:ext>
             </a:extLst>
           </p:cNvPr>
@@ -797,7 +797,7 @@
           <p:cNvPr id="2" name="Title 1">
             <a:extLst>
               <a:ext uri="{FF2B5EF4-FFF2-40B4-BE49-F238E27FC236}">
-                <a16:creationId xmlns:a16="http://schemas.microsoft.com/office/drawing/2014/main" id="{E65AF31C-278F-4D8D-751A-4FE378E8252E}"/>
+                <a16:creationId xmlns:a16="http://schemas.microsoft.com/office/drawing/2014/main" xmlns="" id="{E65AF31C-278F-4D8D-751A-4FE378E8252E}"/>
               </a:ext>
             </a:extLst>
           </p:cNvPr>
@@ -826,7 +826,7 @@
           <p:cNvPr id="3" name="Content Placeholder 2">
             <a:extLst>
               <a:ext uri="{FF2B5EF4-FFF2-40B4-BE49-F238E27FC236}">
-                <a16:creationId xmlns:a16="http://schemas.microsoft.com/office/drawing/2014/main" id="{68164B90-C0C2-B400-8E27-CE3BAC1C16C8}"/>
+                <a16:creationId xmlns:a16="http://schemas.microsoft.com/office/drawing/2014/main" xmlns="" id="{68164B90-C0C2-B400-8E27-CE3BAC1C16C8}"/>
               </a:ext>
             </a:extLst>
           </p:cNvPr>
@@ -884,7 +884,7 @@
           <p:cNvPr id="4" name="Date Placeholder 3">
             <a:extLst>
               <a:ext uri="{FF2B5EF4-FFF2-40B4-BE49-F238E27FC236}">
-                <a16:creationId xmlns:a16="http://schemas.microsoft.com/office/drawing/2014/main" id="{56BDE7C0-A012-CD96-AFF1-3B1B2892E6BC}"/>
+                <a16:creationId xmlns:a16="http://schemas.microsoft.com/office/drawing/2014/main" xmlns="" id="{56BDE7C0-A012-CD96-AFF1-3B1B2892E6BC}"/>
               </a:ext>
             </a:extLst>
           </p:cNvPr>
@@ -913,7 +913,7 @@
           <p:cNvPr id="5" name="Footer Placeholder 4">
             <a:extLst>
               <a:ext uri="{FF2B5EF4-FFF2-40B4-BE49-F238E27FC236}">
-                <a16:creationId xmlns:a16="http://schemas.microsoft.com/office/drawing/2014/main" id="{293A8DF7-A6DD-E61D-6470-742BBA7370BD}"/>
+                <a16:creationId xmlns:a16="http://schemas.microsoft.com/office/drawing/2014/main" xmlns="" id="{293A8DF7-A6DD-E61D-6470-742BBA7370BD}"/>
               </a:ext>
             </a:extLst>
           </p:cNvPr>
@@ -938,7 +938,7 @@
           <p:cNvPr id="6" name="Slide Number Placeholder 5">
             <a:extLst>
               <a:ext uri="{FF2B5EF4-FFF2-40B4-BE49-F238E27FC236}">
-                <a16:creationId xmlns:a16="http://schemas.microsoft.com/office/drawing/2014/main" id="{1C29EC29-8E70-EB54-CEDC-6DBEBC1CCDF1}"/>
+                <a16:creationId xmlns:a16="http://schemas.microsoft.com/office/drawing/2014/main" xmlns="" id="{1C29EC29-8E70-EB54-CEDC-6DBEBC1CCDF1}"/>
               </a:ext>
             </a:extLst>
           </p:cNvPr>
@@ -997,7 +997,7 @@
           <p:cNvPr id="2" name="Title 1">
             <a:extLst>
               <a:ext uri="{FF2B5EF4-FFF2-40B4-BE49-F238E27FC236}">
-                <a16:creationId xmlns:a16="http://schemas.microsoft.com/office/drawing/2014/main" id="{9660ECAC-CEE7-E6F3-FA1B-C3698F117403}"/>
+                <a16:creationId xmlns:a16="http://schemas.microsoft.com/office/drawing/2014/main" xmlns="" id="{9660ECAC-CEE7-E6F3-FA1B-C3698F117403}"/>
               </a:ext>
             </a:extLst>
           </p:cNvPr>
@@ -1035,7 +1035,7 @@
           <p:cNvPr id="3" name="Text Placeholder 2">
             <a:extLst>
               <a:ext uri="{FF2B5EF4-FFF2-40B4-BE49-F238E27FC236}">
-                <a16:creationId xmlns:a16="http://schemas.microsoft.com/office/drawing/2014/main" id="{A8EF7E1F-8965-5B53-DAE6-6E0DFD2AD9AA}"/>
+                <a16:creationId xmlns:a16="http://schemas.microsoft.com/office/drawing/2014/main" xmlns="" id="{A8EF7E1F-8965-5B53-DAE6-6E0DFD2AD9AA}"/>
               </a:ext>
             </a:extLst>
           </p:cNvPr>
@@ -1160,7 +1160,7 @@
           <p:cNvPr id="4" name="Date Placeholder 3">
             <a:extLst>
               <a:ext uri="{FF2B5EF4-FFF2-40B4-BE49-F238E27FC236}">
-                <a16:creationId xmlns:a16="http://schemas.microsoft.com/office/drawing/2014/main" id="{83022A05-40F7-58AE-2015-4DD28A1BEFF6}"/>
+                <a16:creationId xmlns:a16="http://schemas.microsoft.com/office/drawing/2014/main" xmlns="" id="{83022A05-40F7-58AE-2015-4DD28A1BEFF6}"/>
               </a:ext>
             </a:extLst>
           </p:cNvPr>
@@ -1189,7 +1189,7 @@
           <p:cNvPr id="5" name="Footer Placeholder 4">
             <a:extLst>
               <a:ext uri="{FF2B5EF4-FFF2-40B4-BE49-F238E27FC236}">
-                <a16:creationId xmlns:a16="http://schemas.microsoft.com/office/drawing/2014/main" id="{9532D701-34BA-91B5-962B-5F9C8E8F4D10}"/>
+                <a16:creationId xmlns:a16="http://schemas.microsoft.com/office/drawing/2014/main" xmlns="" id="{9532D701-34BA-91B5-962B-5F9C8E8F4D10}"/>
               </a:ext>
             </a:extLst>
           </p:cNvPr>
@@ -1214,7 +1214,7 @@
           <p:cNvPr id="6" name="Slide Number Placeholder 5">
             <a:extLst>
               <a:ext uri="{FF2B5EF4-FFF2-40B4-BE49-F238E27FC236}">
-                <a16:creationId xmlns:a16="http://schemas.microsoft.com/office/drawing/2014/main" id="{4F6877B4-BE2F-FEB1-AD87-BAC3D9655536}"/>
+                <a16:creationId xmlns:a16="http://schemas.microsoft.com/office/drawing/2014/main" xmlns="" id="{4F6877B4-BE2F-FEB1-AD87-BAC3D9655536}"/>
               </a:ext>
             </a:extLst>
           </p:cNvPr>
@@ -1273,7 +1273,7 @@
           <p:cNvPr id="2" name="Title 1">
             <a:extLst>
               <a:ext uri="{FF2B5EF4-FFF2-40B4-BE49-F238E27FC236}">
-                <a16:creationId xmlns:a16="http://schemas.microsoft.com/office/drawing/2014/main" id="{0D734F4B-CAB3-2BB4-DA72-B1B7E82FC630}"/>
+                <a16:creationId xmlns:a16="http://schemas.microsoft.com/office/drawing/2014/main" xmlns="" id="{0D734F4B-CAB3-2BB4-DA72-B1B7E82FC630}"/>
               </a:ext>
             </a:extLst>
           </p:cNvPr>
@@ -1302,7 +1302,7 @@
           <p:cNvPr id="3" name="Content Placeholder 2">
             <a:extLst>
               <a:ext uri="{FF2B5EF4-FFF2-40B4-BE49-F238E27FC236}">
-                <a16:creationId xmlns:a16="http://schemas.microsoft.com/office/drawing/2014/main" id="{B596AE28-D9D7-75DD-33CC-8BFF1F77DCFC}"/>
+                <a16:creationId xmlns:a16="http://schemas.microsoft.com/office/drawing/2014/main" xmlns="" id="{B596AE28-D9D7-75DD-33CC-8BFF1F77DCFC}"/>
               </a:ext>
             </a:extLst>
           </p:cNvPr>
@@ -1365,7 +1365,7 @@
           <p:cNvPr id="4" name="Content Placeholder 3">
             <a:extLst>
               <a:ext uri="{FF2B5EF4-FFF2-40B4-BE49-F238E27FC236}">
-                <a16:creationId xmlns:a16="http://schemas.microsoft.com/office/drawing/2014/main" id="{D4DD38F0-40A8-C688-0B34-C7F664C0E351}"/>
+                <a16:creationId xmlns:a16="http://schemas.microsoft.com/office/drawing/2014/main" xmlns="" id="{D4DD38F0-40A8-C688-0B34-C7F664C0E351}"/>
               </a:ext>
             </a:extLst>
           </p:cNvPr>
@@ -1428,7 +1428,7 @@
           <p:cNvPr id="5" name="Date Placeholder 4">
             <a:extLst>
               <a:ext uri="{FF2B5EF4-FFF2-40B4-BE49-F238E27FC236}">
-                <a16:creationId xmlns:a16="http://schemas.microsoft.com/office/drawing/2014/main" id="{EFEC6003-F067-4CB2-4E78-3CADC7D88B91}"/>
+                <a16:creationId xmlns:a16="http://schemas.microsoft.com/office/drawing/2014/main" xmlns="" id="{EFEC6003-F067-4CB2-4E78-3CADC7D88B91}"/>
               </a:ext>
             </a:extLst>
           </p:cNvPr>
@@ -1457,7 +1457,7 @@
           <p:cNvPr id="6" name="Footer Placeholder 5">
             <a:extLst>
               <a:ext uri="{FF2B5EF4-FFF2-40B4-BE49-F238E27FC236}">
-                <a16:creationId xmlns:a16="http://schemas.microsoft.com/office/drawing/2014/main" id="{4C981AAF-C995-7728-8220-3C83236D196C}"/>
+                <a16:creationId xmlns:a16="http://schemas.microsoft.com/office/drawing/2014/main" xmlns="" id="{4C981AAF-C995-7728-8220-3C83236D196C}"/>
               </a:ext>
             </a:extLst>
           </p:cNvPr>
@@ -1482,7 +1482,7 @@
           <p:cNvPr id="7" name="Slide Number Placeholder 6">
             <a:extLst>
               <a:ext uri="{FF2B5EF4-FFF2-40B4-BE49-F238E27FC236}">
-                <a16:creationId xmlns:a16="http://schemas.microsoft.com/office/drawing/2014/main" id="{6F40EF17-DC03-E824-0F65-EF2C167C7CB0}"/>
+                <a16:creationId xmlns:a16="http://schemas.microsoft.com/office/drawing/2014/main" xmlns="" id="{6F40EF17-DC03-E824-0F65-EF2C167C7CB0}"/>
               </a:ext>
             </a:extLst>
           </p:cNvPr>
@@ -1541,7 +1541,7 @@
           <p:cNvPr id="2" name="Title 1">
             <a:extLst>
               <a:ext uri="{FF2B5EF4-FFF2-40B4-BE49-F238E27FC236}">
-                <a16:creationId xmlns:a16="http://schemas.microsoft.com/office/drawing/2014/main" id="{7662A7C6-225F-BA00-1E9C-11337BA63329}"/>
+                <a16:creationId xmlns:a16="http://schemas.microsoft.com/office/drawing/2014/main" xmlns="" id="{7662A7C6-225F-BA00-1E9C-11337BA63329}"/>
               </a:ext>
             </a:extLst>
           </p:cNvPr>
@@ -1575,7 +1575,7 @@
           <p:cNvPr id="3" name="Text Placeholder 2">
             <a:extLst>
               <a:ext uri="{FF2B5EF4-FFF2-40B4-BE49-F238E27FC236}">
-                <a16:creationId xmlns:a16="http://schemas.microsoft.com/office/drawing/2014/main" id="{E361B76F-9BE5-7C0C-C14D-626E855E02A3}"/>
+                <a16:creationId xmlns:a16="http://schemas.microsoft.com/office/drawing/2014/main" xmlns="" id="{E361B76F-9BE5-7C0C-C14D-626E855E02A3}"/>
               </a:ext>
             </a:extLst>
           </p:cNvPr>
@@ -1646,7 +1646,7 @@
           <p:cNvPr id="4" name="Content Placeholder 3">
             <a:extLst>
               <a:ext uri="{FF2B5EF4-FFF2-40B4-BE49-F238E27FC236}">
-                <a16:creationId xmlns:a16="http://schemas.microsoft.com/office/drawing/2014/main" id="{F59616AE-197F-9419-70B6-8B9C96E55117}"/>
+                <a16:creationId xmlns:a16="http://schemas.microsoft.com/office/drawing/2014/main" xmlns="" id="{F59616AE-197F-9419-70B6-8B9C96E55117}"/>
               </a:ext>
             </a:extLst>
           </p:cNvPr>
@@ -1709,7 +1709,7 @@
           <p:cNvPr id="5" name="Text Placeholder 4">
             <a:extLst>
               <a:ext uri="{FF2B5EF4-FFF2-40B4-BE49-F238E27FC236}">
-                <a16:creationId xmlns:a16="http://schemas.microsoft.com/office/drawing/2014/main" id="{E27C8644-BD24-7499-4B70-285FDBFF301C}"/>
+                <a16:creationId xmlns:a16="http://schemas.microsoft.com/office/drawing/2014/main" xmlns="" id="{E27C8644-BD24-7499-4B70-285FDBFF301C}"/>
               </a:ext>
             </a:extLst>
           </p:cNvPr>
@@ -1780,7 +1780,7 @@
           <p:cNvPr id="6" name="Content Placeholder 5">
             <a:extLst>
               <a:ext uri="{FF2B5EF4-FFF2-40B4-BE49-F238E27FC236}">
-                <a16:creationId xmlns:a16="http://schemas.microsoft.com/office/drawing/2014/main" id="{A2D1B1E6-BBCD-8C90-4A44-422791AB020D}"/>
+                <a16:creationId xmlns:a16="http://schemas.microsoft.com/office/drawing/2014/main" xmlns="" id="{A2D1B1E6-BBCD-8C90-4A44-422791AB020D}"/>
               </a:ext>
             </a:extLst>
           </p:cNvPr>
@@ -1843,7 +1843,7 @@
           <p:cNvPr id="7" name="Date Placeholder 6">
             <a:extLst>
               <a:ext uri="{FF2B5EF4-FFF2-40B4-BE49-F238E27FC236}">
-                <a16:creationId xmlns:a16="http://schemas.microsoft.com/office/drawing/2014/main" id="{411DD8C4-EABA-A263-0C4E-433BE0F1A477}"/>
+                <a16:creationId xmlns:a16="http://schemas.microsoft.com/office/drawing/2014/main" xmlns="" id="{411DD8C4-EABA-A263-0C4E-433BE0F1A477}"/>
               </a:ext>
             </a:extLst>
           </p:cNvPr>
@@ -1872,7 +1872,7 @@
           <p:cNvPr id="8" name="Footer Placeholder 7">
             <a:extLst>
               <a:ext uri="{FF2B5EF4-FFF2-40B4-BE49-F238E27FC236}">
-                <a16:creationId xmlns:a16="http://schemas.microsoft.com/office/drawing/2014/main" id="{3CFF29DA-1ED7-93D1-B5C2-3864A2D9FCC4}"/>
+                <a16:creationId xmlns:a16="http://schemas.microsoft.com/office/drawing/2014/main" xmlns="" id="{3CFF29DA-1ED7-93D1-B5C2-3864A2D9FCC4}"/>
               </a:ext>
             </a:extLst>
           </p:cNvPr>
@@ -1897,7 +1897,7 @@
           <p:cNvPr id="9" name="Slide Number Placeholder 8">
             <a:extLst>
               <a:ext uri="{FF2B5EF4-FFF2-40B4-BE49-F238E27FC236}">
-                <a16:creationId xmlns:a16="http://schemas.microsoft.com/office/drawing/2014/main" id="{BA857150-B9E8-2182-405D-1D71F543F347}"/>
+                <a16:creationId xmlns:a16="http://schemas.microsoft.com/office/drawing/2014/main" xmlns="" id="{BA857150-B9E8-2182-405D-1D71F543F347}"/>
               </a:ext>
             </a:extLst>
           </p:cNvPr>
@@ -1956,7 +1956,7 @@
           <p:cNvPr id="2" name="Title 1">
             <a:extLst>
               <a:ext uri="{FF2B5EF4-FFF2-40B4-BE49-F238E27FC236}">
-                <a16:creationId xmlns:a16="http://schemas.microsoft.com/office/drawing/2014/main" id="{7412A327-79E5-1EA9-6C51-B50200C15556}"/>
+                <a16:creationId xmlns:a16="http://schemas.microsoft.com/office/drawing/2014/main" xmlns="" id="{7412A327-79E5-1EA9-6C51-B50200C15556}"/>
               </a:ext>
             </a:extLst>
           </p:cNvPr>
@@ -1985,7 +1985,7 @@
           <p:cNvPr id="3" name="Date Placeholder 2">
             <a:extLst>
               <a:ext uri="{FF2B5EF4-FFF2-40B4-BE49-F238E27FC236}">
-                <a16:creationId xmlns:a16="http://schemas.microsoft.com/office/drawing/2014/main" id="{70163CC8-A713-3934-44F0-0B52A5503E56}"/>
+                <a16:creationId xmlns:a16="http://schemas.microsoft.com/office/drawing/2014/main" xmlns="" id="{70163CC8-A713-3934-44F0-0B52A5503E56}"/>
               </a:ext>
             </a:extLst>
           </p:cNvPr>
@@ -2014,7 +2014,7 @@
           <p:cNvPr id="4" name="Footer Placeholder 3">
             <a:extLst>
               <a:ext uri="{FF2B5EF4-FFF2-40B4-BE49-F238E27FC236}">
-                <a16:creationId xmlns:a16="http://schemas.microsoft.com/office/drawing/2014/main" id="{FB553E2B-DECB-243F-9CAF-81578DD31DB6}"/>
+                <a16:creationId xmlns:a16="http://schemas.microsoft.com/office/drawing/2014/main" xmlns="" id="{FB553E2B-DECB-243F-9CAF-81578DD31DB6}"/>
               </a:ext>
             </a:extLst>
           </p:cNvPr>
@@ -2039,7 +2039,7 @@
           <p:cNvPr id="5" name="Slide Number Placeholder 4">
             <a:extLst>
               <a:ext uri="{FF2B5EF4-FFF2-40B4-BE49-F238E27FC236}">
-                <a16:creationId xmlns:a16="http://schemas.microsoft.com/office/drawing/2014/main" id="{1F27A29E-1325-7E46-8912-E4389F33472D}"/>
+                <a16:creationId xmlns:a16="http://schemas.microsoft.com/office/drawing/2014/main" xmlns="" id="{1F27A29E-1325-7E46-8912-E4389F33472D}"/>
               </a:ext>
             </a:extLst>
           </p:cNvPr>
@@ -2098,7 +2098,7 @@
           <p:cNvPr id="2" name="Date Placeholder 1">
             <a:extLst>
               <a:ext uri="{FF2B5EF4-FFF2-40B4-BE49-F238E27FC236}">
-                <a16:creationId xmlns:a16="http://schemas.microsoft.com/office/drawing/2014/main" id="{83795579-2CAE-25A7-D3D6-43E7FCCFFC1B}"/>
+                <a16:creationId xmlns:a16="http://schemas.microsoft.com/office/drawing/2014/main" xmlns="" id="{83795579-2CAE-25A7-D3D6-43E7FCCFFC1B}"/>
               </a:ext>
             </a:extLst>
           </p:cNvPr>
@@ -2127,7 +2127,7 @@
           <p:cNvPr id="3" name="Footer Placeholder 2">
             <a:extLst>
               <a:ext uri="{FF2B5EF4-FFF2-40B4-BE49-F238E27FC236}">
-                <a16:creationId xmlns:a16="http://schemas.microsoft.com/office/drawing/2014/main" id="{15C4F7E4-52B0-E698-02D2-A8F92387EC1F}"/>
+                <a16:creationId xmlns:a16="http://schemas.microsoft.com/office/drawing/2014/main" xmlns="" id="{15C4F7E4-52B0-E698-02D2-A8F92387EC1F}"/>
               </a:ext>
             </a:extLst>
           </p:cNvPr>
@@ -2152,7 +2152,7 @@
           <p:cNvPr id="4" name="Slide Number Placeholder 3">
             <a:extLst>
               <a:ext uri="{FF2B5EF4-FFF2-40B4-BE49-F238E27FC236}">
-                <a16:creationId xmlns:a16="http://schemas.microsoft.com/office/drawing/2014/main" id="{3BD1E27C-E165-EC80-50E7-78CA803C7309}"/>
+                <a16:creationId xmlns:a16="http://schemas.microsoft.com/office/drawing/2014/main" xmlns="" id="{3BD1E27C-E165-EC80-50E7-78CA803C7309}"/>
               </a:ext>
             </a:extLst>
           </p:cNvPr>
@@ -2211,7 +2211,7 @@
           <p:cNvPr id="2" name="Title 1">
             <a:extLst>
               <a:ext uri="{FF2B5EF4-FFF2-40B4-BE49-F238E27FC236}">
-                <a16:creationId xmlns:a16="http://schemas.microsoft.com/office/drawing/2014/main" id="{AB3DC267-25D4-F08B-5C3B-DA7646CCE6A0}"/>
+                <a16:creationId xmlns:a16="http://schemas.microsoft.com/office/drawing/2014/main" xmlns="" id="{AB3DC267-25D4-F08B-5C3B-DA7646CCE6A0}"/>
               </a:ext>
             </a:extLst>
           </p:cNvPr>
@@ -2249,7 +2249,7 @@
           <p:cNvPr id="3" name="Content Placeholder 2">
             <a:extLst>
               <a:ext uri="{FF2B5EF4-FFF2-40B4-BE49-F238E27FC236}">
-                <a16:creationId xmlns:a16="http://schemas.microsoft.com/office/drawing/2014/main" id="{1854D0FC-95B8-14E3-069C-5025D67E2262}"/>
+                <a16:creationId xmlns:a16="http://schemas.microsoft.com/office/drawing/2014/main" xmlns="" id="{1854D0FC-95B8-14E3-069C-5025D67E2262}"/>
               </a:ext>
             </a:extLst>
           </p:cNvPr>
@@ -2340,7 +2340,7 @@
           <p:cNvPr id="4" name="Text Placeholder 3">
             <a:extLst>
               <a:ext uri="{FF2B5EF4-FFF2-40B4-BE49-F238E27FC236}">
-                <a16:creationId xmlns:a16="http://schemas.microsoft.com/office/drawing/2014/main" id="{A0BC94D7-029F-2E4A-28B8-AB4179D71DEB}"/>
+                <a16:creationId xmlns:a16="http://schemas.microsoft.com/office/drawing/2014/main" xmlns="" id="{A0BC94D7-029F-2E4A-28B8-AB4179D71DEB}"/>
               </a:ext>
             </a:extLst>
           </p:cNvPr>
@@ -2411,7 +2411,7 @@
           <p:cNvPr id="5" name="Date Placeholder 4">
             <a:extLst>
               <a:ext uri="{FF2B5EF4-FFF2-40B4-BE49-F238E27FC236}">
-                <a16:creationId xmlns:a16="http://schemas.microsoft.com/office/drawing/2014/main" id="{D247C5B1-5F8D-3B40-8383-4443ADF1A6C6}"/>
+                <a16:creationId xmlns:a16="http://schemas.microsoft.com/office/drawing/2014/main" xmlns="" id="{D247C5B1-5F8D-3B40-8383-4443ADF1A6C6}"/>
               </a:ext>
             </a:extLst>
           </p:cNvPr>
@@ -2440,7 +2440,7 @@
           <p:cNvPr id="6" name="Footer Placeholder 5">
             <a:extLst>
               <a:ext uri="{FF2B5EF4-FFF2-40B4-BE49-F238E27FC236}">
-                <a16:creationId xmlns:a16="http://schemas.microsoft.com/office/drawing/2014/main" id="{2202ED55-7ED5-C54C-D980-56B2F61B876E}"/>
+                <a16:creationId xmlns:a16="http://schemas.microsoft.com/office/drawing/2014/main" xmlns="" id="{2202ED55-7ED5-C54C-D980-56B2F61B876E}"/>
               </a:ext>
             </a:extLst>
           </p:cNvPr>
@@ -2465,7 +2465,7 @@
           <p:cNvPr id="7" name="Slide Number Placeholder 6">
             <a:extLst>
               <a:ext uri="{FF2B5EF4-FFF2-40B4-BE49-F238E27FC236}">
-                <a16:creationId xmlns:a16="http://schemas.microsoft.com/office/drawing/2014/main" id="{169E0857-A316-E976-B34F-4BE63219C058}"/>
+                <a16:creationId xmlns:a16="http://schemas.microsoft.com/office/drawing/2014/main" xmlns="" id="{169E0857-A316-E976-B34F-4BE63219C058}"/>
               </a:ext>
             </a:extLst>
           </p:cNvPr>
@@ -2524,7 +2524,7 @@
           <p:cNvPr id="2" name="Title 1">
             <a:extLst>
               <a:ext uri="{FF2B5EF4-FFF2-40B4-BE49-F238E27FC236}">
-                <a16:creationId xmlns:a16="http://schemas.microsoft.com/office/drawing/2014/main" id="{8CC4493B-A5D2-0FB0-53A4-1609E5FA663C}"/>
+                <a16:creationId xmlns:a16="http://schemas.microsoft.com/office/drawing/2014/main" xmlns="" id="{8CC4493B-A5D2-0FB0-53A4-1609E5FA663C}"/>
               </a:ext>
             </a:extLst>
           </p:cNvPr>
@@ -2562,7 +2562,7 @@
           <p:cNvPr id="3" name="Picture Placeholder 2">
             <a:extLst>
               <a:ext uri="{FF2B5EF4-FFF2-40B4-BE49-F238E27FC236}">
-                <a16:creationId xmlns:a16="http://schemas.microsoft.com/office/drawing/2014/main" id="{FF31E883-3767-E138-4F01-4FD155CEAC6E}"/>
+                <a16:creationId xmlns:a16="http://schemas.microsoft.com/office/drawing/2014/main" xmlns="" id="{FF31E883-3767-E138-4F01-4FD155CEAC6E}"/>
               </a:ext>
             </a:extLst>
           </p:cNvPr>
@@ -2629,7 +2629,7 @@
           <p:cNvPr id="4" name="Text Placeholder 3">
             <a:extLst>
               <a:ext uri="{FF2B5EF4-FFF2-40B4-BE49-F238E27FC236}">
-                <a16:creationId xmlns:a16="http://schemas.microsoft.com/office/drawing/2014/main" id="{2D48BC49-E8EA-1A40-F63D-C0195F3D85CC}"/>
+                <a16:creationId xmlns:a16="http://schemas.microsoft.com/office/drawing/2014/main" xmlns="" id="{2D48BC49-E8EA-1A40-F63D-C0195F3D85CC}"/>
               </a:ext>
             </a:extLst>
           </p:cNvPr>
@@ -2700,7 +2700,7 @@
           <p:cNvPr id="5" name="Date Placeholder 4">
             <a:extLst>
               <a:ext uri="{FF2B5EF4-FFF2-40B4-BE49-F238E27FC236}">
-                <a16:creationId xmlns:a16="http://schemas.microsoft.com/office/drawing/2014/main" id="{40885DB9-A42C-569B-B43E-057622428DFC}"/>
+                <a16:creationId xmlns:a16="http://schemas.microsoft.com/office/drawing/2014/main" xmlns="" id="{40885DB9-A42C-569B-B43E-057622428DFC}"/>
               </a:ext>
             </a:extLst>
           </p:cNvPr>
@@ -2729,7 +2729,7 @@
           <p:cNvPr id="6" name="Footer Placeholder 5">
             <a:extLst>
               <a:ext uri="{FF2B5EF4-FFF2-40B4-BE49-F238E27FC236}">
-                <a16:creationId xmlns:a16="http://schemas.microsoft.com/office/drawing/2014/main" id="{707B0940-EDC2-A219-42BE-EC70D8F21BDC}"/>
+                <a16:creationId xmlns:a16="http://schemas.microsoft.com/office/drawing/2014/main" xmlns="" id="{707B0940-EDC2-A219-42BE-EC70D8F21BDC}"/>
               </a:ext>
             </a:extLst>
           </p:cNvPr>
@@ -2754,7 +2754,7 @@
           <p:cNvPr id="7" name="Slide Number Placeholder 6">
             <a:extLst>
               <a:ext uri="{FF2B5EF4-FFF2-40B4-BE49-F238E27FC236}">
-                <a16:creationId xmlns:a16="http://schemas.microsoft.com/office/drawing/2014/main" id="{61EF3FA8-F661-123E-1E24-670CF0BB47AF}"/>
+                <a16:creationId xmlns:a16="http://schemas.microsoft.com/office/drawing/2014/main" xmlns="" id="{61EF3FA8-F661-123E-1E24-670CF0BB47AF}"/>
               </a:ext>
             </a:extLst>
           </p:cNvPr>
@@ -2818,7 +2818,7 @@
           <p:cNvPr id="2" name="Title Placeholder 1">
             <a:extLst>
               <a:ext uri="{FF2B5EF4-FFF2-40B4-BE49-F238E27FC236}">
-                <a16:creationId xmlns:a16="http://schemas.microsoft.com/office/drawing/2014/main" id="{382C42BC-04F2-159E-BAFB-28984F544EA5}"/>
+                <a16:creationId xmlns:a16="http://schemas.microsoft.com/office/drawing/2014/main" xmlns="" id="{382C42BC-04F2-159E-BAFB-28984F544EA5}"/>
               </a:ext>
             </a:extLst>
           </p:cNvPr>
@@ -2857,7 +2857,7 @@
           <p:cNvPr id="3" name="Text Placeholder 2">
             <a:extLst>
               <a:ext uri="{FF2B5EF4-FFF2-40B4-BE49-F238E27FC236}">
-                <a16:creationId xmlns:a16="http://schemas.microsoft.com/office/drawing/2014/main" id="{7ADB8F91-FE28-E3BB-6064-67A79E34BD11}"/>
+                <a16:creationId xmlns:a16="http://schemas.microsoft.com/office/drawing/2014/main" xmlns="" id="{7ADB8F91-FE28-E3BB-6064-67A79E34BD11}"/>
               </a:ext>
             </a:extLst>
           </p:cNvPr>
@@ -2925,7 +2925,7 @@
           <p:cNvPr id="4" name="Date Placeholder 3">
             <a:extLst>
               <a:ext uri="{FF2B5EF4-FFF2-40B4-BE49-F238E27FC236}">
-                <a16:creationId xmlns:a16="http://schemas.microsoft.com/office/drawing/2014/main" id="{CB375B8C-8CC0-9CED-3FE4-1492A7D30BAA}"/>
+                <a16:creationId xmlns:a16="http://schemas.microsoft.com/office/drawing/2014/main" xmlns="" id="{CB375B8C-8CC0-9CED-3FE4-1492A7D30BAA}"/>
               </a:ext>
             </a:extLst>
           </p:cNvPr>
@@ -2972,7 +2972,7 @@
           <p:cNvPr id="5" name="Footer Placeholder 4">
             <a:extLst>
               <a:ext uri="{FF2B5EF4-FFF2-40B4-BE49-F238E27FC236}">
-                <a16:creationId xmlns:a16="http://schemas.microsoft.com/office/drawing/2014/main" id="{CDD8A025-7879-6A62-F853-21EE5ED6EE25}"/>
+                <a16:creationId xmlns:a16="http://schemas.microsoft.com/office/drawing/2014/main" xmlns="" id="{CDD8A025-7879-6A62-F853-21EE5ED6EE25}"/>
               </a:ext>
             </a:extLst>
           </p:cNvPr>
@@ -3015,7 +3015,7 @@
           <p:cNvPr id="6" name="Slide Number Placeholder 5">
             <a:extLst>
               <a:ext uri="{FF2B5EF4-FFF2-40B4-BE49-F238E27FC236}">
-                <a16:creationId xmlns:a16="http://schemas.microsoft.com/office/drawing/2014/main" id="{53EBC9E1-6EBC-CB01-9B9B-00128DC315C6}"/>
+                <a16:creationId xmlns:a16="http://schemas.microsoft.com/office/drawing/2014/main" xmlns="" id="{53EBC9E1-6EBC-CB01-9B9B-00128DC315C6}"/>
               </a:ext>
             </a:extLst>
           </p:cNvPr>
@@ -3380,13 +3380,7 @@
       </p:grpSpPr>
       <p:sp>
         <p:nvSpPr>
-          <p:cNvPr id="2" name="Title 1">
-            <a:extLst>
-              <a:ext uri="{FF2B5EF4-FFF2-40B4-BE49-F238E27FC236}">
-                <a16:creationId xmlns:a16="http://schemas.microsoft.com/office/drawing/2014/main" id="{B55F2F7C-EBA5-A067-D7EB-9EDE30B45358}"/>
-              </a:ext>
-            </a:extLst>
-          </p:cNvPr>
+          <p:cNvPr id="4" name="Title 3"/>
           <p:cNvSpPr>
             <a:spLocks noGrp="1"/>
           </p:cNvSpPr>
@@ -3399,19 +3393,13 @@
           <a:bodyPr/>
           <a:lstStyle/>
           <a:p>
-            <a:endParaRPr lang="en-GB"/>
-          </a:p>
-        </p:txBody>
-      </p:sp>
-      <p:sp>
-        <p:nvSpPr>
-          <p:cNvPr id="3" name="Subtitle 2">
-            <a:extLst>
-              <a:ext uri="{FF2B5EF4-FFF2-40B4-BE49-F238E27FC236}">
-                <a16:creationId xmlns:a16="http://schemas.microsoft.com/office/drawing/2014/main" id="{F34443BC-B6BE-8DA1-10A3-F82CB2A90D69}"/>
-              </a:ext>
-            </a:extLst>
-          </p:cNvPr>
+            <a:endParaRPr lang="en-US" dirty="0"/>
+          </a:p>
+        </p:txBody>
+      </p:sp>
+      <p:sp>
+        <p:nvSpPr>
+          <p:cNvPr id="6" name="Content Placeholder 5"/>
           <p:cNvSpPr>
             <a:spLocks noGrp="1"/>
           </p:cNvSpPr>
@@ -3427,36 +3415,83 @@
           <a:lstStyle/>
           <a:p>
             <a:r>
-              <a:rPr lang="en-GB" dirty="0">
-                <a:hlinkClick r:id="rId2"/>
-              </a:rPr>
-              <a:t>https://pmc.ncbi.nlm.nih.gov/articles/PMC8615531/</a:t>
-            </a:r>
+              <a:rPr lang="en-GB" dirty="0" smtClean="0"/>
+              <a:t>Job interview</a:t>
+            </a:r>
+          </a:p>
+          <a:p>
+            <a:r>
+              <a:rPr lang="en-GB" dirty="0" smtClean="0"/>
+              <a:t>Coding Task presentation</a:t>
+            </a:r>
+          </a:p>
+          <a:p>
             <a:endParaRPr lang="en-GB" dirty="0"/>
           </a:p>
           <a:p>
             <a:r>
-              <a:rPr lang="en-GB" dirty="0">
-                <a:hlinkClick r:id="rId3"/>
-              </a:rPr>
-              <a:t>https://www.sciencedirect.com/topics/medicine-and-dentistry/intermittent-photic-stimulation</a:t>
-            </a:r>
-            <a:endParaRPr lang="en-GB" dirty="0"/>
-          </a:p>
-          <a:p>
-            <a:r>
-              <a:rPr lang="en-GB">
-                <a:hlinkClick r:id="rId4"/>
-              </a:rPr>
-              <a:t>https://pmc.ncbi.nlm.nih.gov/articles/PMC9553892/</a:t>
-            </a:r>
-            <a:endParaRPr lang="en-GB"/>
-          </a:p>
-          <a:p>
-            <a:endParaRPr lang="en-GB"/>
-          </a:p>
-        </p:txBody>
-      </p:sp>
+              <a:rPr lang="en-GB" b="1" dirty="0" err="1" smtClean="0"/>
+              <a:t>Jeroen</a:t>
+            </a:r>
+            <a:r>
+              <a:rPr lang="en-GB" b="1" dirty="0" smtClean="0"/>
+              <a:t> </a:t>
+            </a:r>
+            <a:r>
+              <a:rPr lang="en-GB" b="1" dirty="0" err="1" smtClean="0"/>
+              <a:t>Buil</a:t>
+            </a:r>
+            <a:endParaRPr lang="en-GB" b="1" dirty="0" smtClean="0"/>
+          </a:p>
+          <a:p>
+            <a:pPr marL="0" indent="0">
+              <a:buNone/>
+            </a:pPr>
+            <a:endParaRPr lang="en-US" dirty="0"/>
+          </a:p>
+        </p:txBody>
+      </p:sp>
+      <p:pic>
+        <p:nvPicPr>
+          <p:cNvPr id="5" name="Picture 2" descr="d-EEG-tal - Science Innovation Hub - UNIGE"/>
+          <p:cNvPicPr>
+            <a:picLocks noChangeAspect="1" noChangeArrowheads="1"/>
+          </p:cNvPicPr>
+          <p:nvPr/>
+        </p:nvPicPr>
+        <p:blipFill>
+          <a:blip r:embed="rId2">
+            <a:extLst>
+              <a:ext uri="{28A0092B-C50C-407E-A947-70E740481C1C}">
+                <a14:useLocalDpi xmlns:a14="http://schemas.microsoft.com/office/drawing/2010/main" val="0"/>
+              </a:ext>
+            </a:extLst>
+          </a:blip>
+          <a:srcRect/>
+          <a:stretch>
+            <a:fillRect/>
+          </a:stretch>
+        </p:blipFill>
+        <p:spPr bwMode="auto">
+          <a:xfrm>
+            <a:off x="3685738" y="759125"/>
+            <a:ext cx="4833121" cy="2712259"/>
+          </a:xfrm>
+          <a:prstGeom prst="rect">
+            <a:avLst/>
+          </a:prstGeom>
+          <a:noFill/>
+          <a:extLst>
+            <a:ext uri="{909E8E84-426E-40DD-AFC4-6F175D3DCCD1}">
+              <a14:hiddenFill xmlns:a14="http://schemas.microsoft.com/office/drawing/2010/main">
+                <a:solidFill>
+                  <a:srgbClr val="FFFFFF"/>
+                </a:solidFill>
+              </a14:hiddenFill>
+            </a:ext>
+          </a:extLst>
+        </p:spPr>
+      </p:pic>
     </p:spTree>
     <p:extLst>
       <p:ext uri="{BB962C8B-B14F-4D97-AF65-F5344CB8AC3E}">
@@ -3492,7 +3527,7 @@
           <p:cNvPr id="2" name="Title 1">
             <a:extLst>
               <a:ext uri="{FF2B5EF4-FFF2-40B4-BE49-F238E27FC236}">
-                <a16:creationId xmlns:a16="http://schemas.microsoft.com/office/drawing/2014/main" id="{A71391C0-3AE9-7DD8-2529-34DCB9C5C7F5}"/>
+                <a16:creationId xmlns:a16="http://schemas.microsoft.com/office/drawing/2014/main" xmlns="" id="{A71391C0-3AE9-7DD8-2529-34DCB9C5C7F5}"/>
               </a:ext>
             </a:extLst>
           </p:cNvPr>
@@ -3521,7 +3556,7 @@
           <p:cNvPr id="4" name="Text Placeholder 3">
             <a:extLst>
               <a:ext uri="{FF2B5EF4-FFF2-40B4-BE49-F238E27FC236}">
-                <a16:creationId xmlns:a16="http://schemas.microsoft.com/office/drawing/2014/main" id="{5611C7C8-596E-06F1-2F40-76E9C999A101}"/>
+                <a16:creationId xmlns:a16="http://schemas.microsoft.com/office/drawing/2014/main" xmlns="" id="{5611C7C8-596E-06F1-2F40-76E9C999A101}"/>
               </a:ext>
             </a:extLst>
           </p:cNvPr>
@@ -3549,7 +3584,7 @@
           <p:cNvPr id="11" name="Content Placeholder 10">
             <a:extLst>
               <a:ext uri="{FF2B5EF4-FFF2-40B4-BE49-F238E27FC236}">
-                <a16:creationId xmlns:a16="http://schemas.microsoft.com/office/drawing/2014/main" id="{2D70BE5B-AA9C-130A-88B7-DC7F6DC14CC1}"/>
+                <a16:creationId xmlns:a16="http://schemas.microsoft.com/office/drawing/2014/main" xmlns="" id="{2D70BE5B-AA9C-130A-88B7-DC7F6DC14CC1}"/>
               </a:ext>
             </a:extLst>
           </p:cNvPr>
@@ -3593,7 +3628,7 @@
           <p:cNvPr id="8" name="Text Placeholder 7">
             <a:extLst>
               <a:ext uri="{FF2B5EF4-FFF2-40B4-BE49-F238E27FC236}">
-                <a16:creationId xmlns:a16="http://schemas.microsoft.com/office/drawing/2014/main" id="{0673BDFD-07DE-8B16-B4A7-7AAA0837DB17}"/>
+                <a16:creationId xmlns:a16="http://schemas.microsoft.com/office/drawing/2014/main" xmlns="" id="{0673BDFD-07DE-8B16-B4A7-7AAA0837DB17}"/>
               </a:ext>
             </a:extLst>
           </p:cNvPr>
@@ -3621,7 +3656,7 @@
           <p:cNvPr id="9" name="Content Placeholder 8">
             <a:extLst>
               <a:ext uri="{FF2B5EF4-FFF2-40B4-BE49-F238E27FC236}">
-                <a16:creationId xmlns:a16="http://schemas.microsoft.com/office/drawing/2014/main" id="{16E7BAFF-433E-C05B-427E-67004BD0FA06}"/>
+                <a16:creationId xmlns:a16="http://schemas.microsoft.com/office/drawing/2014/main" xmlns="" id="{16E7BAFF-433E-C05B-427E-67004BD0FA06}"/>
               </a:ext>
             </a:extLst>
           </p:cNvPr>
@@ -3673,7 +3708,7 @@
           <p:cNvPr id="7" name="Group 6">
             <a:extLst>
               <a:ext uri="{FF2B5EF4-FFF2-40B4-BE49-F238E27FC236}">
-                <a16:creationId xmlns:a16="http://schemas.microsoft.com/office/drawing/2014/main" id="{6472A41B-CBB0-94B6-4D9B-B1AB93ECC5DF}"/>
+                <a16:creationId xmlns:a16="http://schemas.microsoft.com/office/drawing/2014/main" xmlns="" id="{6472A41B-CBB0-94B6-4D9B-B1AB93ECC5DF}"/>
               </a:ext>
             </a:extLst>
           </p:cNvPr>
@@ -3693,7 +3728,7 @@
             <p:cNvPr id="5" name="Picture 4" descr="A graph with blue lines and green lines&#10;&#10;Description automatically generated">
               <a:extLst>
                 <a:ext uri="{FF2B5EF4-FFF2-40B4-BE49-F238E27FC236}">
-                  <a16:creationId xmlns:a16="http://schemas.microsoft.com/office/drawing/2014/main" id="{130C3B8E-B6D8-4766-279F-8411E281E98B}"/>
+                  <a16:creationId xmlns:a16="http://schemas.microsoft.com/office/drawing/2014/main" xmlns="" id="{130C3B8E-B6D8-4766-279F-8411E281E98B}"/>
                 </a:ext>
               </a:extLst>
             </p:cNvPr>
@@ -3729,7 +3764,7 @@
             <p:cNvPr id="6" name="TextBox 5">
               <a:extLst>
                 <a:ext uri="{FF2B5EF4-FFF2-40B4-BE49-F238E27FC236}">
-                  <a16:creationId xmlns:a16="http://schemas.microsoft.com/office/drawing/2014/main" id="{31700BA6-CF89-565A-2F0A-B9887456B48C}"/>
+                  <a16:creationId xmlns:a16="http://schemas.microsoft.com/office/drawing/2014/main" xmlns="" id="{31700BA6-CF89-565A-2F0A-B9887456B48C}"/>
                 </a:ext>
               </a:extLst>
             </p:cNvPr>
@@ -3765,7 +3800,7 @@
           <p:cNvPr id="14" name="Group 13">
             <a:extLst>
               <a:ext uri="{FF2B5EF4-FFF2-40B4-BE49-F238E27FC236}">
-                <a16:creationId xmlns:a16="http://schemas.microsoft.com/office/drawing/2014/main" id="{616F617A-EE6A-043C-FC5A-CAFB0826E3D8}"/>
+                <a16:creationId xmlns:a16="http://schemas.microsoft.com/office/drawing/2014/main" xmlns="" id="{616F617A-EE6A-043C-FC5A-CAFB0826E3D8}"/>
               </a:ext>
             </a:extLst>
           </p:cNvPr>
@@ -3785,7 +3820,7 @@
             <p:cNvPr id="12" name="Picture 11" descr="A graph of ecg and ecg&#10;&#10;Description automatically generated">
               <a:extLst>
                 <a:ext uri="{FF2B5EF4-FFF2-40B4-BE49-F238E27FC236}">
-                  <a16:creationId xmlns:a16="http://schemas.microsoft.com/office/drawing/2014/main" id="{21746E25-AB8E-3823-7C60-68C626D957A4}"/>
+                  <a16:creationId xmlns:a16="http://schemas.microsoft.com/office/drawing/2014/main" xmlns="" id="{21746E25-AB8E-3823-7C60-68C626D957A4}"/>
                 </a:ext>
               </a:extLst>
             </p:cNvPr>
@@ -3820,7 +3855,7 @@
             <p:cNvPr id="13" name="TextBox 12">
               <a:extLst>
                 <a:ext uri="{FF2B5EF4-FFF2-40B4-BE49-F238E27FC236}">
-                  <a16:creationId xmlns:a16="http://schemas.microsoft.com/office/drawing/2014/main" id="{F60C1B52-A4B6-B018-0CFB-5C2E41F5995C}"/>
+                  <a16:creationId xmlns:a16="http://schemas.microsoft.com/office/drawing/2014/main" xmlns="" id="{F60C1B52-A4B6-B018-0CFB-5C2E41F5995C}"/>
                 </a:ext>
               </a:extLst>
             </p:cNvPr>
@@ -3857,7 +3892,7 @@
           <p:cNvPr id="15" name="TextBox 14">
             <a:extLst>
               <a:ext uri="{FF2B5EF4-FFF2-40B4-BE49-F238E27FC236}">
-                <a16:creationId xmlns:a16="http://schemas.microsoft.com/office/drawing/2014/main" id="{EE1F7B1D-E7BA-23E7-287A-D891069234AF}"/>
+                <a16:creationId xmlns:a16="http://schemas.microsoft.com/office/drawing/2014/main" xmlns="" id="{EE1F7B1D-E7BA-23E7-287A-D891069234AF}"/>
               </a:ext>
             </a:extLst>
           </p:cNvPr>
@@ -3895,7 +3930,7 @@
           <p:cNvPr id="17" name="Group 16">
             <a:extLst>
               <a:ext uri="{FF2B5EF4-FFF2-40B4-BE49-F238E27FC236}">
-                <a16:creationId xmlns:a16="http://schemas.microsoft.com/office/drawing/2014/main" id="{62B30A00-C60D-CCB4-5792-E6B671ABC139}"/>
+                <a16:creationId xmlns:a16="http://schemas.microsoft.com/office/drawing/2014/main" xmlns="" id="{62B30A00-C60D-CCB4-5792-E6B671ABC139}"/>
               </a:ext>
             </a:extLst>
           </p:cNvPr>
@@ -3915,7 +3950,7 @@
             <p:cNvPr id="10" name="Picture 9" descr="A diagram of a brain activity&#10;&#10;Description automatically generated">
               <a:extLst>
                 <a:ext uri="{FF2B5EF4-FFF2-40B4-BE49-F238E27FC236}">
-                  <a16:creationId xmlns:a16="http://schemas.microsoft.com/office/drawing/2014/main" id="{D8D80D5F-4355-EAC2-0C79-74B1CAF9FFF2}"/>
+                  <a16:creationId xmlns:a16="http://schemas.microsoft.com/office/drawing/2014/main" xmlns="" id="{D8D80D5F-4355-EAC2-0C79-74B1CAF9FFF2}"/>
                 </a:ext>
               </a:extLst>
             </p:cNvPr>
@@ -3950,7 +3985,7 @@
             <p:cNvPr id="16" name="TextBox 15">
               <a:extLst>
                 <a:ext uri="{FF2B5EF4-FFF2-40B4-BE49-F238E27FC236}">
-                  <a16:creationId xmlns:a16="http://schemas.microsoft.com/office/drawing/2014/main" id="{73D34BE1-767B-21D0-F48F-8C11653663E5}"/>
+                  <a16:creationId xmlns:a16="http://schemas.microsoft.com/office/drawing/2014/main" xmlns="" id="{73D34BE1-767B-21D0-F48F-8C11653663E5}"/>
                 </a:ext>
               </a:extLst>
             </p:cNvPr>
@@ -4017,7 +4052,7 @@
           <p:cNvPr id="2" name="Title 1">
             <a:extLst>
               <a:ext uri="{FF2B5EF4-FFF2-40B4-BE49-F238E27FC236}">
-                <a16:creationId xmlns:a16="http://schemas.microsoft.com/office/drawing/2014/main" id="{4C591B32-0E4D-DC76-5437-BF80A3182C12}"/>
+                <a16:creationId xmlns:a16="http://schemas.microsoft.com/office/drawing/2014/main" xmlns="" id="{4C591B32-0E4D-DC76-5437-BF80A3182C12}"/>
               </a:ext>
             </a:extLst>
           </p:cNvPr>
@@ -4045,7 +4080,7 @@
           <p:cNvPr id="3" name="Content Placeholder 2">
             <a:extLst>
               <a:ext uri="{FF2B5EF4-FFF2-40B4-BE49-F238E27FC236}">
-                <a16:creationId xmlns:a16="http://schemas.microsoft.com/office/drawing/2014/main" id="{E792D97A-7426-C0B7-70C9-E91B25BBC093}"/>
+                <a16:creationId xmlns:a16="http://schemas.microsoft.com/office/drawing/2014/main" xmlns="" id="{E792D97A-7426-C0B7-70C9-E91B25BBC093}"/>
               </a:ext>
             </a:extLst>
           </p:cNvPr>
@@ -4123,7 +4158,7 @@
           <p:cNvPr id="11" name="Picture 10" descr="A screenshot of a computer&#10;&#10;Description automatically generated">
             <a:extLst>
               <a:ext uri="{FF2B5EF4-FFF2-40B4-BE49-F238E27FC236}">
-                <a16:creationId xmlns:a16="http://schemas.microsoft.com/office/drawing/2014/main" id="{38A915D1-858D-AAB8-BAA2-158FBDE65C32}"/>
+                <a16:creationId xmlns:a16="http://schemas.microsoft.com/office/drawing/2014/main" xmlns="" id="{38A915D1-858D-AAB8-BAA2-158FBDE65C32}"/>
               </a:ext>
             </a:extLst>
           </p:cNvPr>
@@ -4133,7 +4168,7 @@
           <p:nvPr/>
         </p:nvPicPr>
         <p:blipFill>
-          <a:blip r:embed="rId2">
+          <a:blip r:embed="rId2" cstate="print">
             <a:extLst>
               <a:ext uri="{28A0092B-C50C-407E-A947-70E740481C1C}">
                 <a14:useLocalDpi xmlns:a14="http://schemas.microsoft.com/office/drawing/2010/main" val="0"/>
@@ -4189,7 +4224,7 @@
           <p:cNvPr id="2" name="Title 1">
             <a:extLst>
               <a:ext uri="{FF2B5EF4-FFF2-40B4-BE49-F238E27FC236}">
-                <a16:creationId xmlns:a16="http://schemas.microsoft.com/office/drawing/2014/main" id="{7F0F13F4-55D0-3648-2FB4-7EF646CA91ED}"/>
+                <a16:creationId xmlns:a16="http://schemas.microsoft.com/office/drawing/2014/main" xmlns="" id="{7F0F13F4-55D0-3648-2FB4-7EF646CA91ED}"/>
               </a:ext>
             </a:extLst>
           </p:cNvPr>
@@ -4217,7 +4252,7 @@
           <p:cNvPr id="3" name="Content Placeholder 2">
             <a:extLst>
               <a:ext uri="{FF2B5EF4-FFF2-40B4-BE49-F238E27FC236}">
-                <a16:creationId xmlns:a16="http://schemas.microsoft.com/office/drawing/2014/main" id="{0B41CB12-B324-B8B7-A95B-BD67C46DCE37}"/>
+                <a16:creationId xmlns:a16="http://schemas.microsoft.com/office/drawing/2014/main" xmlns="" id="{0B41CB12-B324-B8B7-A95B-BD67C46DCE37}"/>
               </a:ext>
             </a:extLst>
           </p:cNvPr>
@@ -4327,7 +4362,7 @@
           <p:cNvPr id="2" name="Title 1">
             <a:extLst>
               <a:ext uri="{FF2B5EF4-FFF2-40B4-BE49-F238E27FC236}">
-                <a16:creationId xmlns:a16="http://schemas.microsoft.com/office/drawing/2014/main" id="{70EDACA0-0066-EAB4-109C-6387AC9DDD37}"/>
+                <a16:creationId xmlns:a16="http://schemas.microsoft.com/office/drawing/2014/main" xmlns="" id="{70EDACA0-0066-EAB4-109C-6387AC9DDD37}"/>
               </a:ext>
             </a:extLst>
           </p:cNvPr>
@@ -4355,7 +4390,7 @@
           <p:cNvPr id="3" name="Text Placeholder 2">
             <a:extLst>
               <a:ext uri="{FF2B5EF4-FFF2-40B4-BE49-F238E27FC236}">
-                <a16:creationId xmlns:a16="http://schemas.microsoft.com/office/drawing/2014/main" id="{2F019681-513C-90BA-D479-BEB22008BAD8}"/>
+                <a16:creationId xmlns:a16="http://schemas.microsoft.com/office/drawing/2014/main" xmlns="" id="{2F019681-513C-90BA-D479-BEB22008BAD8}"/>
               </a:ext>
             </a:extLst>
           </p:cNvPr>
@@ -4410,7 +4445,7 @@
           <p:cNvPr id="2" name="Title 1">
             <a:extLst>
               <a:ext uri="{FF2B5EF4-FFF2-40B4-BE49-F238E27FC236}">
-                <a16:creationId xmlns:a16="http://schemas.microsoft.com/office/drawing/2014/main" id="{FBC2C443-6C50-E1B5-A808-DC7EC685123E}"/>
+                <a16:creationId xmlns:a16="http://schemas.microsoft.com/office/drawing/2014/main" xmlns="" id="{FBC2C443-6C50-E1B5-A808-DC7EC685123E}"/>
               </a:ext>
             </a:extLst>
           </p:cNvPr>
@@ -4442,7 +4477,7 @@
           <p:cNvPr id="3" name="Content Placeholder 2">
             <a:extLst>
               <a:ext uri="{FF2B5EF4-FFF2-40B4-BE49-F238E27FC236}">
-                <a16:creationId xmlns:a16="http://schemas.microsoft.com/office/drawing/2014/main" id="{236A5669-9DFD-F709-26D6-1E2D63E8D8BA}"/>
+                <a16:creationId xmlns:a16="http://schemas.microsoft.com/office/drawing/2014/main" xmlns="" id="{236A5669-9DFD-F709-26D6-1E2D63E8D8BA}"/>
               </a:ext>
             </a:extLst>
           </p:cNvPr>
@@ -4477,7 +4512,7 @@
           <p:cNvPr id="5" name="Picture 4">
             <a:extLst>
               <a:ext uri="{FF2B5EF4-FFF2-40B4-BE49-F238E27FC236}">
-                <a16:creationId xmlns:a16="http://schemas.microsoft.com/office/drawing/2014/main" id="{1DFD1997-0479-A4BA-A1DD-DB2731F94142}"/>
+                <a16:creationId xmlns:a16="http://schemas.microsoft.com/office/drawing/2014/main" xmlns="" id="{1DFD1997-0479-A4BA-A1DD-DB2731F94142}"/>
               </a:ext>
             </a:extLst>
           </p:cNvPr>
@@ -4506,7 +4541,7 @@
           <p:cNvPr id="7" name="Picture 6" descr="A warning sign with white text&#10;&#10;Description automatically generated">
             <a:extLst>
               <a:ext uri="{FF2B5EF4-FFF2-40B4-BE49-F238E27FC236}">
-                <a16:creationId xmlns:a16="http://schemas.microsoft.com/office/drawing/2014/main" id="{44E0F90E-1152-9A34-85A4-EBC6F11C6D0E}"/>
+                <a16:creationId xmlns:a16="http://schemas.microsoft.com/office/drawing/2014/main" xmlns="" id="{44E0F90E-1152-9A34-85A4-EBC6F11C6D0E}"/>
               </a:ext>
             </a:extLst>
           </p:cNvPr>
@@ -4516,7 +4551,7 @@
           <p:nvPr/>
         </p:nvPicPr>
         <p:blipFill>
-          <a:blip r:embed="rId3">
+          <a:blip r:embed="rId3" cstate="print">
             <a:extLst>
               <a:ext uri="{28A0092B-C50C-407E-A947-70E740481C1C}">
                 <a14:useLocalDpi xmlns:a14="http://schemas.microsoft.com/office/drawing/2010/main" val="0"/>
@@ -4572,7 +4607,7 @@
           <p:cNvPr id="2" name="Title 1">
             <a:extLst>
               <a:ext uri="{FF2B5EF4-FFF2-40B4-BE49-F238E27FC236}">
-                <a16:creationId xmlns:a16="http://schemas.microsoft.com/office/drawing/2014/main" id="{EAA38D8C-11D9-C1F7-46AC-D8A6E87E34EE}"/>
+                <a16:creationId xmlns:a16="http://schemas.microsoft.com/office/drawing/2014/main" xmlns="" id="{EAA38D8C-11D9-C1F7-46AC-D8A6E87E34EE}"/>
               </a:ext>
             </a:extLst>
           </p:cNvPr>
@@ -4600,7 +4635,7 @@
           <p:cNvPr id="3" name="Content Placeholder 2">
             <a:extLst>
               <a:ext uri="{FF2B5EF4-FFF2-40B4-BE49-F238E27FC236}">
-                <a16:creationId xmlns:a16="http://schemas.microsoft.com/office/drawing/2014/main" id="{016869AF-07FD-7942-B8F8-6E3810FB4BB4}"/>
+                <a16:creationId xmlns:a16="http://schemas.microsoft.com/office/drawing/2014/main" xmlns="" id="{016869AF-07FD-7942-B8F8-6E3810FB4BB4}"/>
               </a:ext>
             </a:extLst>
           </p:cNvPr>
@@ -4634,7 +4669,7 @@
           <p:cNvPr id="4" name="Table 3">
             <a:extLst>
               <a:ext uri="{FF2B5EF4-FFF2-40B4-BE49-F238E27FC236}">
-                <a16:creationId xmlns:a16="http://schemas.microsoft.com/office/drawing/2014/main" id="{AD3FA004-B429-8F5E-0D2D-03F94EAD22DD}"/>
+                <a16:creationId xmlns:a16="http://schemas.microsoft.com/office/drawing/2014/main" xmlns="" id="{AD3FA004-B429-8F5E-0D2D-03F94EAD22DD}"/>
               </a:ext>
             </a:extLst>
           </p:cNvPr>
@@ -4663,28 +4698,28 @@
                 <a:gridCol w="594360">
                   <a:extLst>
                     <a:ext uri="{9D8B030D-6E8A-4147-A177-3AD203B41FA5}">
-                      <a16:colId xmlns:a16="http://schemas.microsoft.com/office/drawing/2014/main" val="111408566"/>
+                      <a16:colId xmlns:a16="http://schemas.microsoft.com/office/drawing/2014/main" xmlns="" val="111408566"/>
                     </a:ext>
                   </a:extLst>
                 </a:gridCol>
                 <a:gridCol w="841248">
                   <a:extLst>
                     <a:ext uri="{9D8B030D-6E8A-4147-A177-3AD203B41FA5}">
-                      <a16:colId xmlns:a16="http://schemas.microsoft.com/office/drawing/2014/main" val="3783979508"/>
+                      <a16:colId xmlns:a16="http://schemas.microsoft.com/office/drawing/2014/main" xmlns="" val="3783979508"/>
                     </a:ext>
                   </a:extLst>
                 </a:gridCol>
                 <a:gridCol w="988563">
                   <a:extLst>
                     <a:ext uri="{9D8B030D-6E8A-4147-A177-3AD203B41FA5}">
-                      <a16:colId xmlns:a16="http://schemas.microsoft.com/office/drawing/2014/main" val="1715166266"/>
+                      <a16:colId xmlns:a16="http://schemas.microsoft.com/office/drawing/2014/main" xmlns="" val="1715166266"/>
                     </a:ext>
                   </a:extLst>
                 </a:gridCol>
                 <a:gridCol w="946581">
                   <a:extLst>
                     <a:ext uri="{9D8B030D-6E8A-4147-A177-3AD203B41FA5}">
-                      <a16:colId xmlns:a16="http://schemas.microsoft.com/office/drawing/2014/main" val="815064266"/>
+                      <a16:colId xmlns:a16="http://schemas.microsoft.com/office/drawing/2014/main" xmlns="" val="815064266"/>
                     </a:ext>
                   </a:extLst>
                 </a:gridCol>
@@ -4756,7 +4791,7 @@
                 </a:tc>
                 <a:extLst>
                   <a:ext uri="{0D108BD9-81ED-4DB2-BD59-A6C34878D82A}">
-                    <a16:rowId xmlns:a16="http://schemas.microsoft.com/office/drawing/2014/main" val="2595477897"/>
+                    <a16:rowId xmlns:a16="http://schemas.microsoft.com/office/drawing/2014/main" xmlns="" val="2595477897"/>
                   </a:ext>
                 </a:extLst>
               </a:tr>
@@ -4839,7 +4874,7 @@
                 </a:tc>
                 <a:extLst>
                   <a:ext uri="{0D108BD9-81ED-4DB2-BD59-A6C34878D82A}">
-                    <a16:rowId xmlns:a16="http://schemas.microsoft.com/office/drawing/2014/main" val="2793756374"/>
+                    <a16:rowId xmlns:a16="http://schemas.microsoft.com/office/drawing/2014/main" xmlns="" val="2793756374"/>
                   </a:ext>
                 </a:extLst>
               </a:tr>
@@ -4922,7 +4957,7 @@
                 </a:tc>
                 <a:extLst>
                   <a:ext uri="{0D108BD9-81ED-4DB2-BD59-A6C34878D82A}">
-                    <a16:rowId xmlns:a16="http://schemas.microsoft.com/office/drawing/2014/main" val="1817001553"/>
+                    <a16:rowId xmlns:a16="http://schemas.microsoft.com/office/drawing/2014/main" xmlns="" val="1817001553"/>
                   </a:ext>
                 </a:extLst>
               </a:tr>
@@ -5005,7 +5040,7 @@
                 </a:tc>
                 <a:extLst>
                   <a:ext uri="{0D108BD9-81ED-4DB2-BD59-A6C34878D82A}">
-                    <a16:rowId xmlns:a16="http://schemas.microsoft.com/office/drawing/2014/main" val="202285892"/>
+                    <a16:rowId xmlns:a16="http://schemas.microsoft.com/office/drawing/2014/main" xmlns="" val="202285892"/>
                   </a:ext>
                 </a:extLst>
               </a:tr>
@@ -5088,7 +5123,7 @@
                 </a:tc>
                 <a:extLst>
                   <a:ext uri="{0D108BD9-81ED-4DB2-BD59-A6C34878D82A}">
-                    <a16:rowId xmlns:a16="http://schemas.microsoft.com/office/drawing/2014/main" val="3019397469"/>
+                    <a16:rowId xmlns:a16="http://schemas.microsoft.com/office/drawing/2014/main" xmlns="" val="3019397469"/>
                   </a:ext>
                 </a:extLst>
               </a:tr>
@@ -5155,7 +5190,7 @@
                 </a:tc>
                 <a:extLst>
                   <a:ext uri="{0D108BD9-81ED-4DB2-BD59-A6C34878D82A}">
-                    <a16:rowId xmlns:a16="http://schemas.microsoft.com/office/drawing/2014/main" val="2453038063"/>
+                    <a16:rowId xmlns:a16="http://schemas.microsoft.com/office/drawing/2014/main" xmlns="" val="2453038063"/>
                   </a:ext>
                 </a:extLst>
               </a:tr>
@@ -5222,7 +5257,7 @@
                 </a:tc>
                 <a:extLst>
                   <a:ext uri="{0D108BD9-81ED-4DB2-BD59-A6C34878D82A}">
-                    <a16:rowId xmlns:a16="http://schemas.microsoft.com/office/drawing/2014/main" val="2395400633"/>
+                    <a16:rowId xmlns:a16="http://schemas.microsoft.com/office/drawing/2014/main" xmlns="" val="2395400633"/>
                   </a:ext>
                 </a:extLst>
               </a:tr>
@@ -5289,7 +5324,7 @@
                 </a:tc>
                 <a:extLst>
                   <a:ext uri="{0D108BD9-81ED-4DB2-BD59-A6C34878D82A}">
-                    <a16:rowId xmlns:a16="http://schemas.microsoft.com/office/drawing/2014/main" val="278446480"/>
+                    <a16:rowId xmlns:a16="http://schemas.microsoft.com/office/drawing/2014/main" xmlns="" val="278446480"/>
                   </a:ext>
                 </a:extLst>
               </a:tr>
@@ -5396,7 +5431,7 @@
                 </a:tc>
                 <a:extLst>
                   <a:ext uri="{0D108BD9-81ED-4DB2-BD59-A6C34878D82A}">
-                    <a16:rowId xmlns:a16="http://schemas.microsoft.com/office/drawing/2014/main" val="2995144103"/>
+                    <a16:rowId xmlns:a16="http://schemas.microsoft.com/office/drawing/2014/main" xmlns="" val="2995144103"/>
                   </a:ext>
                 </a:extLst>
               </a:tr>
@@ -5515,7 +5550,7 @@
                 </a:tc>
                 <a:extLst>
                   <a:ext uri="{0D108BD9-81ED-4DB2-BD59-A6C34878D82A}">
-                    <a16:rowId xmlns:a16="http://schemas.microsoft.com/office/drawing/2014/main" val="33628614"/>
+                    <a16:rowId xmlns:a16="http://schemas.microsoft.com/office/drawing/2014/main" xmlns="" val="33628614"/>
                   </a:ext>
                 </a:extLst>
               </a:tr>
@@ -5598,7 +5633,7 @@
                 </a:tc>
                 <a:extLst>
                   <a:ext uri="{0D108BD9-81ED-4DB2-BD59-A6C34878D82A}">
-                    <a16:rowId xmlns:a16="http://schemas.microsoft.com/office/drawing/2014/main" val="1280402641"/>
+                    <a16:rowId xmlns:a16="http://schemas.microsoft.com/office/drawing/2014/main" xmlns="" val="1280402641"/>
                   </a:ext>
                 </a:extLst>
               </a:tr>
@@ -5681,7 +5716,7 @@
                 </a:tc>
                 <a:extLst>
                   <a:ext uri="{0D108BD9-81ED-4DB2-BD59-A6C34878D82A}">
-                    <a16:rowId xmlns:a16="http://schemas.microsoft.com/office/drawing/2014/main" val="2983268447"/>
+                    <a16:rowId xmlns:a16="http://schemas.microsoft.com/office/drawing/2014/main" xmlns="" val="2983268447"/>
                   </a:ext>
                 </a:extLst>
               </a:tr>
@@ -5764,7 +5799,7 @@
                 </a:tc>
                 <a:extLst>
                   <a:ext uri="{0D108BD9-81ED-4DB2-BD59-A6C34878D82A}">
-                    <a16:rowId xmlns:a16="http://schemas.microsoft.com/office/drawing/2014/main" val="1635432972"/>
+                    <a16:rowId xmlns:a16="http://schemas.microsoft.com/office/drawing/2014/main" xmlns="" val="1635432972"/>
                   </a:ext>
                 </a:extLst>
               </a:tr>
@@ -5831,7 +5866,7 @@
                 </a:tc>
                 <a:extLst>
                   <a:ext uri="{0D108BD9-81ED-4DB2-BD59-A6C34878D82A}">
-                    <a16:rowId xmlns:a16="http://schemas.microsoft.com/office/drawing/2014/main" val="118346155"/>
+                    <a16:rowId xmlns:a16="http://schemas.microsoft.com/office/drawing/2014/main" xmlns="" val="118346155"/>
                   </a:ext>
                 </a:extLst>
               </a:tr>
@@ -5898,7 +5933,7 @@
                 </a:tc>
                 <a:extLst>
                   <a:ext uri="{0D108BD9-81ED-4DB2-BD59-A6C34878D82A}">
-                    <a16:rowId xmlns:a16="http://schemas.microsoft.com/office/drawing/2014/main" val="3432465217"/>
+                    <a16:rowId xmlns:a16="http://schemas.microsoft.com/office/drawing/2014/main" xmlns="" val="3432465217"/>
                   </a:ext>
                 </a:extLst>
               </a:tr>
@@ -5965,7 +6000,7 @@
                 </a:tc>
                 <a:extLst>
                   <a:ext uri="{0D108BD9-81ED-4DB2-BD59-A6C34878D82A}">
-                    <a16:rowId xmlns:a16="http://schemas.microsoft.com/office/drawing/2014/main" val="2446123427"/>
+                    <a16:rowId xmlns:a16="http://schemas.microsoft.com/office/drawing/2014/main" xmlns="" val="2446123427"/>
                   </a:ext>
                 </a:extLst>
               </a:tr>
@@ -6072,7 +6107,7 @@
                 </a:tc>
                 <a:extLst>
                   <a:ext uri="{0D108BD9-81ED-4DB2-BD59-A6C34878D82A}">
-                    <a16:rowId xmlns:a16="http://schemas.microsoft.com/office/drawing/2014/main" val="2331126314"/>
+                    <a16:rowId xmlns:a16="http://schemas.microsoft.com/office/drawing/2014/main" xmlns="" val="2331126314"/>
                   </a:ext>
                 </a:extLst>
               </a:tr>
@@ -6191,7 +6226,7 @@
                 </a:tc>
                 <a:extLst>
                   <a:ext uri="{0D108BD9-81ED-4DB2-BD59-A6C34878D82A}">
-                    <a16:rowId xmlns:a16="http://schemas.microsoft.com/office/drawing/2014/main" val="1167548050"/>
+                    <a16:rowId xmlns:a16="http://schemas.microsoft.com/office/drawing/2014/main" xmlns="" val="1167548050"/>
                   </a:ext>
                 </a:extLst>
               </a:tr>
@@ -6274,7 +6309,7 @@
                 </a:tc>
                 <a:extLst>
                   <a:ext uri="{0D108BD9-81ED-4DB2-BD59-A6C34878D82A}">
-                    <a16:rowId xmlns:a16="http://schemas.microsoft.com/office/drawing/2014/main" val="2257857313"/>
+                    <a16:rowId xmlns:a16="http://schemas.microsoft.com/office/drawing/2014/main" xmlns="" val="2257857313"/>
                   </a:ext>
                 </a:extLst>
               </a:tr>
@@ -6357,7 +6392,7 @@
                 </a:tc>
                 <a:extLst>
                   <a:ext uri="{0D108BD9-81ED-4DB2-BD59-A6C34878D82A}">
-                    <a16:rowId xmlns:a16="http://schemas.microsoft.com/office/drawing/2014/main" val="128136624"/>
+                    <a16:rowId xmlns:a16="http://schemas.microsoft.com/office/drawing/2014/main" xmlns="" val="128136624"/>
                   </a:ext>
                 </a:extLst>
               </a:tr>
@@ -6440,7 +6475,7 @@
                 </a:tc>
                 <a:extLst>
                   <a:ext uri="{0D108BD9-81ED-4DB2-BD59-A6C34878D82A}">
-                    <a16:rowId xmlns:a16="http://schemas.microsoft.com/office/drawing/2014/main" val="57376096"/>
+                    <a16:rowId xmlns:a16="http://schemas.microsoft.com/office/drawing/2014/main" xmlns="" val="57376096"/>
                   </a:ext>
                 </a:extLst>
               </a:tr>
@@ -6507,7 +6542,7 @@
                 </a:tc>
                 <a:extLst>
                   <a:ext uri="{0D108BD9-81ED-4DB2-BD59-A6C34878D82A}">
-                    <a16:rowId xmlns:a16="http://schemas.microsoft.com/office/drawing/2014/main" val="1876731788"/>
+                    <a16:rowId xmlns:a16="http://schemas.microsoft.com/office/drawing/2014/main" xmlns="" val="1876731788"/>
                   </a:ext>
                 </a:extLst>
               </a:tr>
@@ -6574,7 +6609,7 @@
                 </a:tc>
                 <a:extLst>
                   <a:ext uri="{0D108BD9-81ED-4DB2-BD59-A6C34878D82A}">
-                    <a16:rowId xmlns:a16="http://schemas.microsoft.com/office/drawing/2014/main" val="1419056787"/>
+                    <a16:rowId xmlns:a16="http://schemas.microsoft.com/office/drawing/2014/main" xmlns="" val="1419056787"/>
                   </a:ext>
                 </a:extLst>
               </a:tr>
@@ -6641,7 +6676,7 @@
                 </a:tc>
                 <a:extLst>
                   <a:ext uri="{0D108BD9-81ED-4DB2-BD59-A6C34878D82A}">
-                    <a16:rowId xmlns:a16="http://schemas.microsoft.com/office/drawing/2014/main" val="2659290613"/>
+                    <a16:rowId xmlns:a16="http://schemas.microsoft.com/office/drawing/2014/main" xmlns="" val="2659290613"/>
                   </a:ext>
                 </a:extLst>
               </a:tr>
@@ -6708,7 +6743,7 @@
                 </a:tc>
                 <a:extLst>
                   <a:ext uri="{0D108BD9-81ED-4DB2-BD59-A6C34878D82A}">
-                    <a16:rowId xmlns:a16="http://schemas.microsoft.com/office/drawing/2014/main" val="1646393061"/>
+                    <a16:rowId xmlns:a16="http://schemas.microsoft.com/office/drawing/2014/main" xmlns="" val="1646393061"/>
                   </a:ext>
                 </a:extLst>
               </a:tr>
@@ -6751,7 +6786,7 @@
           <p:cNvPr id="2" name="Title 1">
             <a:extLst>
               <a:ext uri="{FF2B5EF4-FFF2-40B4-BE49-F238E27FC236}">
-                <a16:creationId xmlns:a16="http://schemas.microsoft.com/office/drawing/2014/main" id="{30A4763E-B127-FF1E-4188-8A50201C2293}"/>
+                <a16:creationId xmlns:a16="http://schemas.microsoft.com/office/drawing/2014/main" xmlns="" id="{30A4763E-B127-FF1E-4188-8A50201C2293}"/>
               </a:ext>
             </a:extLst>
           </p:cNvPr>
@@ -6791,7 +6826,7 @@
           <p:cNvPr id="3" name="Content Placeholder 2">
             <a:extLst>
               <a:ext uri="{FF2B5EF4-FFF2-40B4-BE49-F238E27FC236}">
-                <a16:creationId xmlns:a16="http://schemas.microsoft.com/office/drawing/2014/main" id="{DDC6794B-2BB3-30DB-E98B-491136572BBE}"/>
+                <a16:creationId xmlns:a16="http://schemas.microsoft.com/office/drawing/2014/main" xmlns="" id="{DDC6794B-2BB3-30DB-E98B-491136572BBE}"/>
               </a:ext>
             </a:extLst>
           </p:cNvPr>
@@ -6830,7 +6865,7 @@
           <p:cNvPr id="5" name="Picture 4">
             <a:extLst>
               <a:ext uri="{FF2B5EF4-FFF2-40B4-BE49-F238E27FC236}">
-                <a16:creationId xmlns:a16="http://schemas.microsoft.com/office/drawing/2014/main" id="{C7448442-D46E-4C4F-6850-039EDC5099F0}"/>
+                <a16:creationId xmlns:a16="http://schemas.microsoft.com/office/drawing/2014/main" xmlns="" id="{C7448442-D46E-4C4F-6850-039EDC5099F0}"/>
               </a:ext>
             </a:extLst>
           </p:cNvPr>
@@ -6890,7 +6925,7 @@
           <p:cNvPr id="2" name="Title 1">
             <a:extLst>
               <a:ext uri="{FF2B5EF4-FFF2-40B4-BE49-F238E27FC236}">
-                <a16:creationId xmlns:a16="http://schemas.microsoft.com/office/drawing/2014/main" id="{C23BABE6-B522-A9C4-6766-98F15B8CBEE9}"/>
+                <a16:creationId xmlns:a16="http://schemas.microsoft.com/office/drawing/2014/main" xmlns="" id="{C23BABE6-B522-A9C4-6766-98F15B8CBEE9}"/>
               </a:ext>
             </a:extLst>
           </p:cNvPr>
@@ -6918,7 +6953,7 @@
           <p:cNvPr id="3" name="Content Placeholder 2">
             <a:extLst>
               <a:ext uri="{FF2B5EF4-FFF2-40B4-BE49-F238E27FC236}">
-                <a16:creationId xmlns:a16="http://schemas.microsoft.com/office/drawing/2014/main" id="{DA7019F4-8C77-B129-10DF-745DD1EC487C}"/>
+                <a16:creationId xmlns:a16="http://schemas.microsoft.com/office/drawing/2014/main" xmlns="" id="{DA7019F4-8C77-B129-10DF-745DD1EC487C}"/>
               </a:ext>
             </a:extLst>
           </p:cNvPr>
@@ -7041,7 +7076,7 @@
           <p:cNvPr id="2" name="Title 1">
             <a:extLst>
               <a:ext uri="{FF2B5EF4-FFF2-40B4-BE49-F238E27FC236}">
-                <a16:creationId xmlns:a16="http://schemas.microsoft.com/office/drawing/2014/main" id="{B29A2698-5AD5-8764-3EC0-6761F889A24F}"/>
+                <a16:creationId xmlns:a16="http://schemas.microsoft.com/office/drawing/2014/main" xmlns="" id="{B29A2698-5AD5-8764-3EC0-6761F889A24F}"/>
               </a:ext>
             </a:extLst>
           </p:cNvPr>
@@ -7069,7 +7104,7 @@
           <p:cNvPr id="3" name="Text Placeholder 2">
             <a:extLst>
               <a:ext uri="{FF2B5EF4-FFF2-40B4-BE49-F238E27FC236}">
-                <a16:creationId xmlns:a16="http://schemas.microsoft.com/office/drawing/2014/main" id="{D9E2AE85-8F51-0FFA-230A-3010F378FC7D}"/>
+                <a16:creationId xmlns:a16="http://schemas.microsoft.com/office/drawing/2014/main" xmlns="" id="{D9E2AE85-8F51-0FFA-230A-3010F378FC7D}"/>
               </a:ext>
             </a:extLst>
           </p:cNvPr>
@@ -7124,7 +7159,7 @@
           <p:cNvPr id="2" name="Title 1">
             <a:extLst>
               <a:ext uri="{FF2B5EF4-FFF2-40B4-BE49-F238E27FC236}">
-                <a16:creationId xmlns:a16="http://schemas.microsoft.com/office/drawing/2014/main" id="{D6AA6658-01EC-238A-F162-35AF88FC64A8}"/>
+                <a16:creationId xmlns:a16="http://schemas.microsoft.com/office/drawing/2014/main" xmlns="" id="{D6AA6658-01EC-238A-F162-35AF88FC64A8}"/>
               </a:ext>
             </a:extLst>
           </p:cNvPr>
@@ -7152,7 +7187,7 @@
           <p:cNvPr id="3" name="Content Placeholder 2">
             <a:extLst>
               <a:ext uri="{FF2B5EF4-FFF2-40B4-BE49-F238E27FC236}">
-                <a16:creationId xmlns:a16="http://schemas.microsoft.com/office/drawing/2014/main" id="{560D0F02-B4AE-B1AA-315F-B3F2223E7B64}"/>
+                <a16:creationId xmlns:a16="http://schemas.microsoft.com/office/drawing/2014/main" xmlns="" id="{560D0F02-B4AE-B1AA-315F-B3F2223E7B64}"/>
               </a:ext>
             </a:extLst>
           </p:cNvPr>
@@ -7228,7 +7263,7 @@
           <p:cNvPr id="4" name="Arrow: Right 3">
             <a:extLst>
               <a:ext uri="{FF2B5EF4-FFF2-40B4-BE49-F238E27FC236}">
-                <a16:creationId xmlns:a16="http://schemas.microsoft.com/office/drawing/2014/main" id="{57188DEF-2F4D-C1E4-0EB4-BB86A02D3CA4}"/>
+                <a16:creationId xmlns:a16="http://schemas.microsoft.com/office/drawing/2014/main" xmlns="" id="{57188DEF-2F4D-C1E4-0EB4-BB86A02D3CA4}"/>
               </a:ext>
             </a:extLst>
           </p:cNvPr>
@@ -7274,7 +7309,7 @@
           <p:cNvPr id="5" name="Arrow: Right 4">
             <a:extLst>
               <a:ext uri="{FF2B5EF4-FFF2-40B4-BE49-F238E27FC236}">
-                <a16:creationId xmlns:a16="http://schemas.microsoft.com/office/drawing/2014/main" id="{9A0DB99A-51D0-A3B7-2EED-F6DA180F8D10}"/>
+                <a16:creationId xmlns:a16="http://schemas.microsoft.com/office/drawing/2014/main" xmlns="" id="{9A0DB99A-51D0-A3B7-2EED-F6DA180F8D10}"/>
               </a:ext>
             </a:extLst>
           </p:cNvPr>
@@ -7320,7 +7355,7 @@
           <p:cNvPr id="6" name="TextBox 5">
             <a:extLst>
               <a:ext uri="{FF2B5EF4-FFF2-40B4-BE49-F238E27FC236}">
-                <a16:creationId xmlns:a16="http://schemas.microsoft.com/office/drawing/2014/main" id="{C74C63E1-5780-3665-A094-18D8A3005D7D}"/>
+                <a16:creationId xmlns:a16="http://schemas.microsoft.com/office/drawing/2014/main" xmlns="" id="{C74C63E1-5780-3665-A094-18D8A3005D7D}"/>
               </a:ext>
             </a:extLst>
           </p:cNvPr>
@@ -7383,7 +7418,7 @@
           <p:cNvPr id="9" name="Arrow: Right 8">
             <a:extLst>
               <a:ext uri="{FF2B5EF4-FFF2-40B4-BE49-F238E27FC236}">
-                <a16:creationId xmlns:a16="http://schemas.microsoft.com/office/drawing/2014/main" id="{330691FF-2C87-3366-F47F-DF633AED3A86}"/>
+                <a16:creationId xmlns:a16="http://schemas.microsoft.com/office/drawing/2014/main" xmlns="" id="{330691FF-2C87-3366-F47F-DF633AED3A86}"/>
               </a:ext>
             </a:extLst>
           </p:cNvPr>
@@ -7429,7 +7464,7 @@
           <p:cNvPr id="11" name="TextBox 10">
             <a:extLst>
               <a:ext uri="{FF2B5EF4-FFF2-40B4-BE49-F238E27FC236}">
-                <a16:creationId xmlns:a16="http://schemas.microsoft.com/office/drawing/2014/main" id="{6C0BB9F8-6324-AE04-2724-A866B9AF8BEF}"/>
+                <a16:creationId xmlns:a16="http://schemas.microsoft.com/office/drawing/2014/main" xmlns="" id="{6C0BB9F8-6324-AE04-2724-A866B9AF8BEF}"/>
               </a:ext>
             </a:extLst>
           </p:cNvPr>
@@ -7492,7 +7527,7 @@
           <p:cNvPr id="15" name="Group 14">
             <a:extLst>
               <a:ext uri="{FF2B5EF4-FFF2-40B4-BE49-F238E27FC236}">
-                <a16:creationId xmlns:a16="http://schemas.microsoft.com/office/drawing/2014/main" id="{42EE1119-5257-2B71-6857-E875D9647C2D}"/>
+                <a16:creationId xmlns:a16="http://schemas.microsoft.com/office/drawing/2014/main" xmlns="" id="{42EE1119-5257-2B71-6857-E875D9647C2D}"/>
               </a:ext>
             </a:extLst>
           </p:cNvPr>
@@ -7512,7 +7547,7 @@
             <p:cNvPr id="7" name="Rectangle: Rounded Corners 6">
               <a:extLst>
                 <a:ext uri="{FF2B5EF4-FFF2-40B4-BE49-F238E27FC236}">
-                  <a16:creationId xmlns:a16="http://schemas.microsoft.com/office/drawing/2014/main" id="{01C6637A-2243-02B1-D39D-792E2C7EDCD9}"/>
+                  <a16:creationId xmlns:a16="http://schemas.microsoft.com/office/drawing/2014/main" xmlns="" id="{01C6637A-2243-02B1-D39D-792E2C7EDCD9}"/>
                 </a:ext>
               </a:extLst>
             </p:cNvPr>
@@ -7558,7 +7593,7 @@
             <p:cNvPr id="8" name="TextBox 7">
               <a:extLst>
                 <a:ext uri="{FF2B5EF4-FFF2-40B4-BE49-F238E27FC236}">
-                  <a16:creationId xmlns:a16="http://schemas.microsoft.com/office/drawing/2014/main" id="{52B0D9B1-6137-2FAB-2807-0E81E65DF743}"/>
+                  <a16:creationId xmlns:a16="http://schemas.microsoft.com/office/drawing/2014/main" xmlns="" id="{52B0D9B1-6137-2FAB-2807-0E81E65DF743}"/>
                 </a:ext>
               </a:extLst>
             </p:cNvPr>
@@ -7600,7 +7635,7 @@
           <p:cNvPr id="14" name="Group 13">
             <a:extLst>
               <a:ext uri="{FF2B5EF4-FFF2-40B4-BE49-F238E27FC236}">
-                <a16:creationId xmlns:a16="http://schemas.microsoft.com/office/drawing/2014/main" id="{B1C33B2E-9113-96FA-6E0F-63A0628BE612}"/>
+                <a16:creationId xmlns:a16="http://schemas.microsoft.com/office/drawing/2014/main" xmlns="" id="{B1C33B2E-9113-96FA-6E0F-63A0628BE612}"/>
               </a:ext>
             </a:extLst>
           </p:cNvPr>
@@ -7620,7 +7655,7 @@
             <p:cNvPr id="12" name="Rectangle: Rounded Corners 11">
               <a:extLst>
                 <a:ext uri="{FF2B5EF4-FFF2-40B4-BE49-F238E27FC236}">
-                  <a16:creationId xmlns:a16="http://schemas.microsoft.com/office/drawing/2014/main" id="{11D1D7C7-D542-DBDC-1364-D62D0EE66BD7}"/>
+                  <a16:creationId xmlns:a16="http://schemas.microsoft.com/office/drawing/2014/main" xmlns="" id="{11D1D7C7-D542-DBDC-1364-D62D0EE66BD7}"/>
                 </a:ext>
               </a:extLst>
             </p:cNvPr>
@@ -7672,7 +7707,7 @@
             <p:cNvPr id="13" name="TextBox 12">
               <a:extLst>
                 <a:ext uri="{FF2B5EF4-FFF2-40B4-BE49-F238E27FC236}">
-                  <a16:creationId xmlns:a16="http://schemas.microsoft.com/office/drawing/2014/main" id="{B2C24613-49C5-5493-3BEC-84DCA9AD376B}"/>
+                  <a16:creationId xmlns:a16="http://schemas.microsoft.com/office/drawing/2014/main" xmlns="" id="{B2C24613-49C5-5493-3BEC-84DCA9AD376B}"/>
                 </a:ext>
               </a:extLst>
             </p:cNvPr>
@@ -7714,7 +7749,7 @@
           <p:cNvPr id="16" name="TextBox 15">
             <a:extLst>
               <a:ext uri="{FF2B5EF4-FFF2-40B4-BE49-F238E27FC236}">
-                <a16:creationId xmlns:a16="http://schemas.microsoft.com/office/drawing/2014/main" id="{004453C8-222D-5DE3-B7C9-478D851B8AC1}"/>
+                <a16:creationId xmlns:a16="http://schemas.microsoft.com/office/drawing/2014/main" xmlns="" id="{004453C8-222D-5DE3-B7C9-478D851B8AC1}"/>
               </a:ext>
             </a:extLst>
           </p:cNvPr>
@@ -7796,7 +7831,7 @@
           <p:cNvPr id="2" name="Title 1">
             <a:extLst>
               <a:ext uri="{FF2B5EF4-FFF2-40B4-BE49-F238E27FC236}">
-                <a16:creationId xmlns:a16="http://schemas.microsoft.com/office/drawing/2014/main" id="{42CAB9CF-68C6-C82C-4144-B60783FE8C1A}"/>
+                <a16:creationId xmlns:a16="http://schemas.microsoft.com/office/drawing/2014/main" xmlns="" id="{42CAB9CF-68C6-C82C-4144-B60783FE8C1A}"/>
               </a:ext>
             </a:extLst>
           </p:cNvPr>
@@ -7824,7 +7859,7 @@
           <p:cNvPr id="3" name="Content Placeholder 2">
             <a:extLst>
               <a:ext uri="{FF2B5EF4-FFF2-40B4-BE49-F238E27FC236}">
-                <a16:creationId xmlns:a16="http://schemas.microsoft.com/office/drawing/2014/main" id="{E186AABB-F026-942D-2158-CED7DD4A6803}"/>
+                <a16:creationId xmlns:a16="http://schemas.microsoft.com/office/drawing/2014/main" xmlns="" id="{E186AABB-F026-942D-2158-CED7DD4A6803}"/>
               </a:ext>
             </a:extLst>
           </p:cNvPr>
@@ -7906,7 +7941,7 @@
           <p:cNvPr id="8" name="Picture 7">
             <a:extLst>
               <a:ext uri="{FF2B5EF4-FFF2-40B4-BE49-F238E27FC236}">
-                <a16:creationId xmlns:a16="http://schemas.microsoft.com/office/drawing/2014/main" id="{1C77FDF4-C966-A92D-3ACD-09F38EFDD90C}"/>
+                <a16:creationId xmlns:a16="http://schemas.microsoft.com/office/drawing/2014/main" xmlns="" id="{1C77FDF4-C966-A92D-3ACD-09F38EFDD90C}"/>
               </a:ext>
             </a:extLst>
           </p:cNvPr>
@@ -7966,7 +8001,7 @@
           <p:cNvPr id="2" name="Title 1">
             <a:extLst>
               <a:ext uri="{FF2B5EF4-FFF2-40B4-BE49-F238E27FC236}">
-                <a16:creationId xmlns:a16="http://schemas.microsoft.com/office/drawing/2014/main" id="{3971CD4B-B0B4-F657-5D82-75973D36921C}"/>
+                <a16:creationId xmlns:a16="http://schemas.microsoft.com/office/drawing/2014/main" xmlns="" id="{3971CD4B-B0B4-F657-5D82-75973D36921C}"/>
               </a:ext>
             </a:extLst>
           </p:cNvPr>
@@ -7994,7 +8029,7 @@
           <p:cNvPr id="3" name="Content Placeholder 2">
             <a:extLst>
               <a:ext uri="{FF2B5EF4-FFF2-40B4-BE49-F238E27FC236}">
-                <a16:creationId xmlns:a16="http://schemas.microsoft.com/office/drawing/2014/main" id="{7DCD5789-5C4B-5228-CF2C-299879FD1947}"/>
+                <a16:creationId xmlns:a16="http://schemas.microsoft.com/office/drawing/2014/main" xmlns="" id="{7DCD5789-5C4B-5228-CF2C-299879FD1947}"/>
               </a:ext>
             </a:extLst>
           </p:cNvPr>
@@ -8061,7 +8096,7 @@
           <p:cNvPr id="2" name="Title 1">
             <a:extLst>
               <a:ext uri="{FF2B5EF4-FFF2-40B4-BE49-F238E27FC236}">
-                <a16:creationId xmlns:a16="http://schemas.microsoft.com/office/drawing/2014/main" id="{70147F0D-A683-C98D-CE4E-CCF9DF4F3925}"/>
+                <a16:creationId xmlns:a16="http://schemas.microsoft.com/office/drawing/2014/main" xmlns="" id="{70147F0D-A683-C98D-CE4E-CCF9DF4F3925}"/>
               </a:ext>
             </a:extLst>
           </p:cNvPr>
@@ -8090,7 +8125,7 @@
           <p:cNvPr id="3" name="Content Placeholder 2">
             <a:extLst>
               <a:ext uri="{FF2B5EF4-FFF2-40B4-BE49-F238E27FC236}">
-                <a16:creationId xmlns:a16="http://schemas.microsoft.com/office/drawing/2014/main" id="{FB383055-E497-C2B5-F61A-2329690F4270}"/>
+                <a16:creationId xmlns:a16="http://schemas.microsoft.com/office/drawing/2014/main" xmlns="" id="{FB383055-E497-C2B5-F61A-2329690F4270}"/>
               </a:ext>
             </a:extLst>
           </p:cNvPr>
@@ -8195,7 +8230,7 @@
           <p:cNvPr id="2" name="Title 1">
             <a:extLst>
               <a:ext uri="{FF2B5EF4-FFF2-40B4-BE49-F238E27FC236}">
-                <a16:creationId xmlns:a16="http://schemas.microsoft.com/office/drawing/2014/main" id="{B939C9AD-5D40-FCD1-BD03-0F9789725849}"/>
+                <a16:creationId xmlns:a16="http://schemas.microsoft.com/office/drawing/2014/main" xmlns="" id="{B939C9AD-5D40-FCD1-BD03-0F9789725849}"/>
               </a:ext>
             </a:extLst>
           </p:cNvPr>
@@ -8223,7 +8258,7 @@
           <p:cNvPr id="9" name="Content Placeholder 8">
             <a:extLst>
               <a:ext uri="{FF2B5EF4-FFF2-40B4-BE49-F238E27FC236}">
-                <a16:creationId xmlns:a16="http://schemas.microsoft.com/office/drawing/2014/main" id="{4A5F046E-B199-CAA5-CCB1-D71B6C0FA04D}"/>
+                <a16:creationId xmlns:a16="http://schemas.microsoft.com/office/drawing/2014/main" xmlns="" id="{4A5F046E-B199-CAA5-CCB1-D71B6C0FA04D}"/>
               </a:ext>
             </a:extLst>
           </p:cNvPr>
@@ -8252,7 +8287,7 @@
           <p:cNvPr id="7" name="Picture 6">
             <a:extLst>
               <a:ext uri="{FF2B5EF4-FFF2-40B4-BE49-F238E27FC236}">
-                <a16:creationId xmlns:a16="http://schemas.microsoft.com/office/drawing/2014/main" id="{E6C8316A-B626-3DC9-EA1E-4EF58DCB2B87}"/>
+                <a16:creationId xmlns:a16="http://schemas.microsoft.com/office/drawing/2014/main" xmlns="" id="{E6C8316A-B626-3DC9-EA1E-4EF58DCB2B87}"/>
               </a:ext>
             </a:extLst>
           </p:cNvPr>
@@ -8282,7 +8317,7 @@
           <p:cNvPr id="10" name="TextBox 9">
             <a:extLst>
               <a:ext uri="{FF2B5EF4-FFF2-40B4-BE49-F238E27FC236}">
-                <a16:creationId xmlns:a16="http://schemas.microsoft.com/office/drawing/2014/main" id="{98627FE2-7541-D079-97C6-555E6034E284}"/>
+                <a16:creationId xmlns:a16="http://schemas.microsoft.com/office/drawing/2014/main" xmlns="" id="{98627FE2-7541-D079-97C6-555E6034E284}"/>
               </a:ext>
             </a:extLst>
           </p:cNvPr>
@@ -8355,7 +8390,7 @@
           <p:cNvPr id="2" name="Title 1">
             <a:extLst>
               <a:ext uri="{FF2B5EF4-FFF2-40B4-BE49-F238E27FC236}">
-                <a16:creationId xmlns:a16="http://schemas.microsoft.com/office/drawing/2014/main" id="{2A7C6E17-8422-45AF-8EF9-901F7968ED8E}"/>
+                <a16:creationId xmlns:a16="http://schemas.microsoft.com/office/drawing/2014/main" xmlns="" id="{2A7C6E17-8422-45AF-8EF9-901F7968ED8E}"/>
               </a:ext>
             </a:extLst>
           </p:cNvPr>
@@ -8380,7 +8415,7 @@
           <p:cNvPr id="3" name="Content Placeholder 2">
             <a:extLst>
               <a:ext uri="{FF2B5EF4-FFF2-40B4-BE49-F238E27FC236}">
-                <a16:creationId xmlns:a16="http://schemas.microsoft.com/office/drawing/2014/main" id="{6E934A46-52E3-4FA7-E3EB-75A3352EC662}"/>
+                <a16:creationId xmlns:a16="http://schemas.microsoft.com/office/drawing/2014/main" xmlns="" id="{6E934A46-52E3-4FA7-E3EB-75A3352EC662}"/>
               </a:ext>
             </a:extLst>
           </p:cNvPr>
@@ -8405,7 +8440,7 @@
           <p:cNvPr id="9" name="Picture 8" descr="A screenshot of a computer&#10;&#10;Description automatically generated">
             <a:extLst>
               <a:ext uri="{FF2B5EF4-FFF2-40B4-BE49-F238E27FC236}">
-                <a16:creationId xmlns:a16="http://schemas.microsoft.com/office/drawing/2014/main" id="{B6BB7602-D30D-529B-55B8-5B9C5C07B0FA}"/>
+                <a16:creationId xmlns:a16="http://schemas.microsoft.com/office/drawing/2014/main" xmlns="" id="{B6BB7602-D30D-529B-55B8-5B9C5C07B0FA}"/>
               </a:ext>
             </a:extLst>
           </p:cNvPr>
@@ -8471,7 +8506,7 @@
           <p:cNvPr id="2" name="Title 1">
             <a:extLst>
               <a:ext uri="{FF2B5EF4-FFF2-40B4-BE49-F238E27FC236}">
-                <a16:creationId xmlns:a16="http://schemas.microsoft.com/office/drawing/2014/main" id="{CE914FC1-246C-F19E-BB9E-38BA3EAC5210}"/>
+                <a16:creationId xmlns:a16="http://schemas.microsoft.com/office/drawing/2014/main" xmlns="" id="{CE914FC1-246C-F19E-BB9E-38BA3EAC5210}"/>
               </a:ext>
             </a:extLst>
           </p:cNvPr>
@@ -8499,7 +8534,7 @@
           <p:cNvPr id="3" name="Content Placeholder 2">
             <a:extLst>
               <a:ext uri="{FF2B5EF4-FFF2-40B4-BE49-F238E27FC236}">
-                <a16:creationId xmlns:a16="http://schemas.microsoft.com/office/drawing/2014/main" id="{82A175D7-940D-3325-F000-4D0F1F5F5EEC}"/>
+                <a16:creationId xmlns:a16="http://schemas.microsoft.com/office/drawing/2014/main" xmlns="" id="{82A175D7-940D-3325-F000-4D0F1F5F5EEC}"/>
               </a:ext>
             </a:extLst>
           </p:cNvPr>
@@ -8615,7 +8650,7 @@
           <p:cNvPr id="2" name="Title 1">
             <a:extLst>
               <a:ext uri="{FF2B5EF4-FFF2-40B4-BE49-F238E27FC236}">
-                <a16:creationId xmlns:a16="http://schemas.microsoft.com/office/drawing/2014/main" id="{C5B1F0B2-C727-BC62-BC58-5F1DFFBC26D8}"/>
+                <a16:creationId xmlns:a16="http://schemas.microsoft.com/office/drawing/2014/main" xmlns="" id="{C5B1F0B2-C727-BC62-BC58-5F1DFFBC26D8}"/>
               </a:ext>
             </a:extLst>
           </p:cNvPr>
@@ -8647,7 +8682,7 @@
           <p:cNvPr id="9" name="Content Placeholder 8">
             <a:extLst>
               <a:ext uri="{FF2B5EF4-FFF2-40B4-BE49-F238E27FC236}">
-                <a16:creationId xmlns:a16="http://schemas.microsoft.com/office/drawing/2014/main" id="{5C926287-609A-A817-FF52-9D8534935485}"/>
+                <a16:creationId xmlns:a16="http://schemas.microsoft.com/office/drawing/2014/main" xmlns="" id="{5C926287-609A-A817-FF52-9D8534935485}"/>
               </a:ext>
             </a:extLst>
           </p:cNvPr>
@@ -8676,7 +8711,7 @@
           <p:cNvPr id="7" name="Picture 6">
             <a:extLst>
               <a:ext uri="{FF2B5EF4-FFF2-40B4-BE49-F238E27FC236}">
-                <a16:creationId xmlns:a16="http://schemas.microsoft.com/office/drawing/2014/main" id="{558F7566-AAA5-23A4-A61C-2C80711EED7E}"/>
+                <a16:creationId xmlns:a16="http://schemas.microsoft.com/office/drawing/2014/main" xmlns="" id="{558F7566-AAA5-23A4-A61C-2C80711EED7E}"/>
               </a:ext>
             </a:extLst>
           </p:cNvPr>
@@ -8706,7 +8741,7 @@
           <p:cNvPr id="10" name="TextBox 9">
             <a:extLst>
               <a:ext uri="{FF2B5EF4-FFF2-40B4-BE49-F238E27FC236}">
-                <a16:creationId xmlns:a16="http://schemas.microsoft.com/office/drawing/2014/main" id="{C00F9C12-0392-90F8-A5DF-6EE07A938C12}"/>
+                <a16:creationId xmlns:a16="http://schemas.microsoft.com/office/drawing/2014/main" xmlns="" id="{C00F9C12-0392-90F8-A5DF-6EE07A938C12}"/>
               </a:ext>
             </a:extLst>
           </p:cNvPr>
@@ -8775,7 +8810,7 @@
           <p:cNvPr id="2" name="Title 1">
             <a:extLst>
               <a:ext uri="{FF2B5EF4-FFF2-40B4-BE49-F238E27FC236}">
-                <a16:creationId xmlns:a16="http://schemas.microsoft.com/office/drawing/2014/main" id="{454A56CB-A70F-C359-0779-27F5B9DABD8A}"/>
+                <a16:creationId xmlns:a16="http://schemas.microsoft.com/office/drawing/2014/main" xmlns="" id="{454A56CB-A70F-C359-0779-27F5B9DABD8A}"/>
               </a:ext>
             </a:extLst>
           </p:cNvPr>
@@ -8803,7 +8838,7 @@
           <p:cNvPr id="3" name="Content Placeholder 2">
             <a:extLst>
               <a:ext uri="{FF2B5EF4-FFF2-40B4-BE49-F238E27FC236}">
-                <a16:creationId xmlns:a16="http://schemas.microsoft.com/office/drawing/2014/main" id="{11AB0F93-B639-3EC0-E584-1302B916E559}"/>
+                <a16:creationId xmlns:a16="http://schemas.microsoft.com/office/drawing/2014/main" xmlns="" id="{11AB0F93-B639-3EC0-E584-1302B916E559}"/>
               </a:ext>
             </a:extLst>
           </p:cNvPr>
@@ -8828,7 +8863,7 @@
           <p:cNvPr id="5" name="Picture 4" descr="A black text on a white background&#10;&#10;Description automatically generated">
             <a:extLst>
               <a:ext uri="{FF2B5EF4-FFF2-40B4-BE49-F238E27FC236}">
-                <a16:creationId xmlns:a16="http://schemas.microsoft.com/office/drawing/2014/main" id="{7C9B2215-3E07-C0D2-F4EF-A1F9EE3E1F68}"/>
+                <a16:creationId xmlns:a16="http://schemas.microsoft.com/office/drawing/2014/main" xmlns="" id="{7C9B2215-3E07-C0D2-F4EF-A1F9EE3E1F68}"/>
               </a:ext>
             </a:extLst>
           </p:cNvPr>
@@ -8894,7 +8929,7 @@
           <p:cNvPr id="2" name="Title 1">
             <a:extLst>
               <a:ext uri="{FF2B5EF4-FFF2-40B4-BE49-F238E27FC236}">
-                <a16:creationId xmlns:a16="http://schemas.microsoft.com/office/drawing/2014/main" id="{47A4501E-5F16-FBCD-9B1E-2F5A0CE41D57}"/>
+                <a16:creationId xmlns:a16="http://schemas.microsoft.com/office/drawing/2014/main" xmlns="" id="{47A4501E-5F16-FBCD-9B1E-2F5A0CE41D57}"/>
               </a:ext>
             </a:extLst>
           </p:cNvPr>
@@ -8922,7 +8957,7 @@
           <p:cNvPr id="3" name="Text Placeholder 2">
             <a:extLst>
               <a:ext uri="{FF2B5EF4-FFF2-40B4-BE49-F238E27FC236}">
-                <a16:creationId xmlns:a16="http://schemas.microsoft.com/office/drawing/2014/main" id="{B4F6EC1F-54FF-E9D2-3C8A-9A494DC2C8D2}"/>
+                <a16:creationId xmlns:a16="http://schemas.microsoft.com/office/drawing/2014/main" xmlns="" id="{B4F6EC1F-54FF-E9D2-3C8A-9A494DC2C8D2}"/>
               </a:ext>
             </a:extLst>
           </p:cNvPr>
@@ -8977,7 +9012,7 @@
           <p:cNvPr id="4" name="Title 3">
             <a:extLst>
               <a:ext uri="{FF2B5EF4-FFF2-40B4-BE49-F238E27FC236}">
-                <a16:creationId xmlns:a16="http://schemas.microsoft.com/office/drawing/2014/main" id="{F1FDE157-BD5A-CE93-CC57-3803388AC6EC}"/>
+                <a16:creationId xmlns:a16="http://schemas.microsoft.com/office/drawing/2014/main" xmlns="" id="{F1FDE157-BD5A-CE93-CC57-3803388AC6EC}"/>
               </a:ext>
             </a:extLst>
           </p:cNvPr>
@@ -9005,7 +9040,7 @@
           <p:cNvPr id="5" name="Content Placeholder 4">
             <a:extLst>
               <a:ext uri="{FF2B5EF4-FFF2-40B4-BE49-F238E27FC236}">
-                <a16:creationId xmlns:a16="http://schemas.microsoft.com/office/drawing/2014/main" id="{6728A368-CAD2-7A35-F615-FDF35DCC286A}"/>
+                <a16:creationId xmlns:a16="http://schemas.microsoft.com/office/drawing/2014/main" xmlns="" id="{6728A368-CAD2-7A35-F615-FDF35DCC286A}"/>
               </a:ext>
             </a:extLst>
           </p:cNvPr>
@@ -9209,7 +9244,7 @@
           <p:cNvPr id="2" name="Title 1">
             <a:extLst>
               <a:ext uri="{FF2B5EF4-FFF2-40B4-BE49-F238E27FC236}">
-                <a16:creationId xmlns:a16="http://schemas.microsoft.com/office/drawing/2014/main" id="{5D8A0A50-5B9E-1A9A-04D3-AF170714689E}"/>
+                <a16:creationId xmlns:a16="http://schemas.microsoft.com/office/drawing/2014/main" xmlns="" id="{5D8A0A50-5B9E-1A9A-04D3-AF170714689E}"/>
               </a:ext>
             </a:extLst>
           </p:cNvPr>
@@ -9241,7 +9276,7 @@
           <p:cNvPr id="3" name="Content Placeholder 2">
             <a:extLst>
               <a:ext uri="{FF2B5EF4-FFF2-40B4-BE49-F238E27FC236}">
-                <a16:creationId xmlns:a16="http://schemas.microsoft.com/office/drawing/2014/main" id="{97AC7DF4-FAB1-C6C5-15E2-053A6934FEEB}"/>
+                <a16:creationId xmlns:a16="http://schemas.microsoft.com/office/drawing/2014/main" xmlns="" id="{97AC7DF4-FAB1-C6C5-15E2-053A6934FEEB}"/>
               </a:ext>
             </a:extLst>
           </p:cNvPr>
@@ -9318,7 +9353,7 @@
           <p:cNvPr id="2" name="Title 1">
             <a:extLst>
               <a:ext uri="{FF2B5EF4-FFF2-40B4-BE49-F238E27FC236}">
-                <a16:creationId xmlns:a16="http://schemas.microsoft.com/office/drawing/2014/main" id="{4501616F-6084-10C4-0290-487EF33AFE28}"/>
+                <a16:creationId xmlns:a16="http://schemas.microsoft.com/office/drawing/2014/main" xmlns="" id="{4501616F-6084-10C4-0290-487EF33AFE28}"/>
               </a:ext>
             </a:extLst>
           </p:cNvPr>
@@ -9346,7 +9381,7 @@
           <p:cNvPr id="3" name="Content Placeholder 2">
             <a:extLst>
               <a:ext uri="{FF2B5EF4-FFF2-40B4-BE49-F238E27FC236}">
-                <a16:creationId xmlns:a16="http://schemas.microsoft.com/office/drawing/2014/main" id="{6FCA331A-D667-84C5-7B4D-4DE18D6E9330}"/>
+                <a16:creationId xmlns:a16="http://schemas.microsoft.com/office/drawing/2014/main" xmlns="" id="{6FCA331A-D667-84C5-7B4D-4DE18D6E9330}"/>
               </a:ext>
             </a:extLst>
           </p:cNvPr>
@@ -9418,7 +9453,7 @@
           <p:cNvPr id="7" name="Group 6">
             <a:extLst>
               <a:ext uri="{FF2B5EF4-FFF2-40B4-BE49-F238E27FC236}">
-                <a16:creationId xmlns:a16="http://schemas.microsoft.com/office/drawing/2014/main" id="{223EFA90-8ECC-E6E8-9459-1099994AD0F7}"/>
+                <a16:creationId xmlns:a16="http://schemas.microsoft.com/office/drawing/2014/main" xmlns="" id="{223EFA90-8ECC-E6E8-9459-1099994AD0F7}"/>
               </a:ext>
             </a:extLst>
           </p:cNvPr>
@@ -9438,7 +9473,7 @@
             <p:cNvPr id="5" name="Picture 4" descr="A pie chart with numbers and text&#10;&#10;Description automatically generated">
               <a:extLst>
                 <a:ext uri="{FF2B5EF4-FFF2-40B4-BE49-F238E27FC236}">
-                  <a16:creationId xmlns:a16="http://schemas.microsoft.com/office/drawing/2014/main" id="{5638B23E-9E08-FC62-62FE-1B12E096AE4E}"/>
+                  <a16:creationId xmlns:a16="http://schemas.microsoft.com/office/drawing/2014/main" xmlns="" id="{5638B23E-9E08-FC62-62FE-1B12E096AE4E}"/>
                 </a:ext>
               </a:extLst>
             </p:cNvPr>
@@ -9473,7 +9508,7 @@
             <p:cNvPr id="6" name="TextBox 5">
               <a:extLst>
                 <a:ext uri="{FF2B5EF4-FFF2-40B4-BE49-F238E27FC236}">
-                  <a16:creationId xmlns:a16="http://schemas.microsoft.com/office/drawing/2014/main" id="{A57457AB-8114-C81C-CDB6-A3917E53D03B}"/>
+                  <a16:creationId xmlns:a16="http://schemas.microsoft.com/office/drawing/2014/main" xmlns="" id="{A57457AB-8114-C81C-CDB6-A3917E53D03B}"/>
                 </a:ext>
               </a:extLst>
             </p:cNvPr>
@@ -9540,7 +9575,7 @@
           <p:cNvPr id="2" name="Title 1">
             <a:extLst>
               <a:ext uri="{FF2B5EF4-FFF2-40B4-BE49-F238E27FC236}">
-                <a16:creationId xmlns:a16="http://schemas.microsoft.com/office/drawing/2014/main" id="{3B966F3B-2096-09EB-832E-A8F2F237B444}"/>
+                <a16:creationId xmlns:a16="http://schemas.microsoft.com/office/drawing/2014/main" xmlns="" id="{3B966F3B-2096-09EB-832E-A8F2F237B444}"/>
               </a:ext>
             </a:extLst>
           </p:cNvPr>
@@ -9568,7 +9603,7 @@
           <p:cNvPr id="3" name="Content Placeholder 2">
             <a:extLst>
               <a:ext uri="{FF2B5EF4-FFF2-40B4-BE49-F238E27FC236}">
-                <a16:creationId xmlns:a16="http://schemas.microsoft.com/office/drawing/2014/main" id="{046BE2F6-FA3D-F9F3-C2B5-4B5A8CAF6C54}"/>
+                <a16:creationId xmlns:a16="http://schemas.microsoft.com/office/drawing/2014/main" xmlns="" id="{046BE2F6-FA3D-F9F3-C2B5-4B5A8CAF6C54}"/>
               </a:ext>
             </a:extLst>
           </p:cNvPr>
@@ -9676,7 +9711,7 @@
           <p:cNvPr id="4" name="Title 3">
             <a:extLst>
               <a:ext uri="{FF2B5EF4-FFF2-40B4-BE49-F238E27FC236}">
-                <a16:creationId xmlns:a16="http://schemas.microsoft.com/office/drawing/2014/main" id="{87B8CEC8-E73C-05CA-E8AA-82D63FEBF7A3}"/>
+                <a16:creationId xmlns:a16="http://schemas.microsoft.com/office/drawing/2014/main" xmlns="" id="{87B8CEC8-E73C-05CA-E8AA-82D63FEBF7A3}"/>
               </a:ext>
             </a:extLst>
           </p:cNvPr>
@@ -9704,7 +9739,7 @@
           <p:cNvPr id="3" name="Content Placeholder 2">
             <a:extLst>
               <a:ext uri="{FF2B5EF4-FFF2-40B4-BE49-F238E27FC236}">
-                <a16:creationId xmlns:a16="http://schemas.microsoft.com/office/drawing/2014/main" id="{CD934F8F-78AA-563B-9701-F7530A227FA6}"/>
+                <a16:creationId xmlns:a16="http://schemas.microsoft.com/office/drawing/2014/main" xmlns="" id="{CD934F8F-78AA-563B-9701-F7530A227FA6}"/>
               </a:ext>
             </a:extLst>
           </p:cNvPr>
@@ -9761,7 +9796,7 @@
           <p:cNvPr id="2" name="Title 1">
             <a:extLst>
               <a:ext uri="{FF2B5EF4-FFF2-40B4-BE49-F238E27FC236}">
-                <a16:creationId xmlns:a16="http://schemas.microsoft.com/office/drawing/2014/main" id="{A387ADE2-5DCE-908C-6F6E-53991A4DC9B6}"/>
+                <a16:creationId xmlns:a16="http://schemas.microsoft.com/office/drawing/2014/main" xmlns="" id="{A387ADE2-5DCE-908C-6F6E-53991A4DC9B6}"/>
               </a:ext>
             </a:extLst>
           </p:cNvPr>
@@ -9789,7 +9824,7 @@
           <p:cNvPr id="3" name="Content Placeholder 2">
             <a:extLst>
               <a:ext uri="{FF2B5EF4-FFF2-40B4-BE49-F238E27FC236}">
-                <a16:creationId xmlns:a16="http://schemas.microsoft.com/office/drawing/2014/main" id="{E429667C-2662-29D9-1386-FB7C5D6A20E8}"/>
+                <a16:creationId xmlns:a16="http://schemas.microsoft.com/office/drawing/2014/main" xmlns="" id="{E429667C-2662-29D9-1386-FB7C5D6A20E8}"/>
               </a:ext>
             </a:extLst>
           </p:cNvPr>
@@ -9874,7 +9909,7 @@
           <p:cNvPr id="2" name="Title 1">
             <a:extLst>
               <a:ext uri="{FF2B5EF4-FFF2-40B4-BE49-F238E27FC236}">
-                <a16:creationId xmlns:a16="http://schemas.microsoft.com/office/drawing/2014/main" id="{4BE18E1D-F639-DFB9-2832-ED67065D803E}"/>
+                <a16:creationId xmlns:a16="http://schemas.microsoft.com/office/drawing/2014/main" xmlns="" id="{4BE18E1D-F639-DFB9-2832-ED67065D803E}"/>
               </a:ext>
             </a:extLst>
           </p:cNvPr>
@@ -9902,7 +9937,7 @@
           <p:cNvPr id="3" name="Content Placeholder 2">
             <a:extLst>
               <a:ext uri="{FF2B5EF4-FFF2-40B4-BE49-F238E27FC236}">
-                <a16:creationId xmlns:a16="http://schemas.microsoft.com/office/drawing/2014/main" id="{2FC2F601-01DC-0B29-0634-D390033D9AC8}"/>
+                <a16:creationId xmlns:a16="http://schemas.microsoft.com/office/drawing/2014/main" xmlns="" id="{2FC2F601-01DC-0B29-0634-D390033D9AC8}"/>
               </a:ext>
             </a:extLst>
           </p:cNvPr>
@@ -9953,7 +9988,7 @@
           <p:cNvPr id="5" name="Picture 4">
             <a:extLst>
               <a:ext uri="{FF2B5EF4-FFF2-40B4-BE49-F238E27FC236}">
-                <a16:creationId xmlns:a16="http://schemas.microsoft.com/office/drawing/2014/main" id="{1257D97C-5159-407C-947F-00F85F186E5A}"/>
+                <a16:creationId xmlns:a16="http://schemas.microsoft.com/office/drawing/2014/main" xmlns="" id="{1257D97C-5159-407C-947F-00F85F186E5A}"/>
               </a:ext>
             </a:extLst>
           </p:cNvPr>
@@ -9983,7 +10018,7 @@
           <p:cNvPr id="4" name="Content Placeholder 2">
             <a:extLst>
               <a:ext uri="{FF2B5EF4-FFF2-40B4-BE49-F238E27FC236}">
-                <a16:creationId xmlns:a16="http://schemas.microsoft.com/office/drawing/2014/main" id="{EFBDD6A1-C74B-1483-B9D9-81A803D16614}"/>
+                <a16:creationId xmlns:a16="http://schemas.microsoft.com/office/drawing/2014/main" xmlns="" id="{EFBDD6A1-C74B-1483-B9D9-81A803D16614}"/>
               </a:ext>
             </a:extLst>
           </p:cNvPr>
@@ -10205,7 +10240,7 @@
           <p:cNvPr id="6" name="Content Placeholder 2">
             <a:extLst>
               <a:ext uri="{FF2B5EF4-FFF2-40B4-BE49-F238E27FC236}">
-                <a16:creationId xmlns:a16="http://schemas.microsoft.com/office/drawing/2014/main" id="{2E8BA57A-0EDC-C162-D85C-D8F8FEE641CC}"/>
+                <a16:creationId xmlns:a16="http://schemas.microsoft.com/office/drawing/2014/main" xmlns="" id="{2E8BA57A-0EDC-C162-D85C-D8F8FEE641CC}"/>
               </a:ext>
             </a:extLst>
           </p:cNvPr>
@@ -10436,7 +10471,7 @@
           <p:cNvPr id="7" name="Content Placeholder 2">
             <a:extLst>
               <a:ext uri="{FF2B5EF4-FFF2-40B4-BE49-F238E27FC236}">
-                <a16:creationId xmlns:a16="http://schemas.microsoft.com/office/drawing/2014/main" id="{956E975E-8D26-D907-6FCC-9778A745826D}"/>
+                <a16:creationId xmlns:a16="http://schemas.microsoft.com/office/drawing/2014/main" xmlns="" id="{956E975E-8D26-D907-6FCC-9778A745826D}"/>
               </a:ext>
             </a:extLst>
           </p:cNvPr>
@@ -10717,7 +10752,7 @@
           <p:cNvPr id="2" name="Title 1">
             <a:extLst>
               <a:ext uri="{FF2B5EF4-FFF2-40B4-BE49-F238E27FC236}">
-                <a16:creationId xmlns:a16="http://schemas.microsoft.com/office/drawing/2014/main" id="{5E3C9868-6BC2-4CEC-4EF3-DBFDAB77A8F5}"/>
+                <a16:creationId xmlns:a16="http://schemas.microsoft.com/office/drawing/2014/main" xmlns="" id="{5E3C9868-6BC2-4CEC-4EF3-DBFDAB77A8F5}"/>
               </a:ext>
             </a:extLst>
           </p:cNvPr>
@@ -10745,7 +10780,7 @@
           <p:cNvPr id="3" name="Content Placeholder 2">
             <a:extLst>
               <a:ext uri="{FF2B5EF4-FFF2-40B4-BE49-F238E27FC236}">
-                <a16:creationId xmlns:a16="http://schemas.microsoft.com/office/drawing/2014/main" id="{1FF8DD75-FB12-B0DE-5701-8F1346A8D1BA}"/>
+                <a16:creationId xmlns:a16="http://schemas.microsoft.com/office/drawing/2014/main" xmlns="" id="{1FF8DD75-FB12-B0DE-5701-8F1346A8D1BA}"/>
               </a:ext>
             </a:extLst>
           </p:cNvPr>
@@ -10809,7 +10844,7 @@
           <p:cNvPr id="5" name="Content Placeholder 4">
             <a:extLst>
               <a:ext uri="{FF2B5EF4-FFF2-40B4-BE49-F238E27FC236}">
-                <a16:creationId xmlns:a16="http://schemas.microsoft.com/office/drawing/2014/main" id="{95D0C53B-F812-3E56-6197-E5FC63B002E6}"/>
+                <a16:creationId xmlns:a16="http://schemas.microsoft.com/office/drawing/2014/main" xmlns="" id="{95D0C53B-F812-3E56-6197-E5FC63B002E6}"/>
               </a:ext>
             </a:extLst>
           </p:cNvPr>
@@ -10891,7 +10926,7 @@
           <p:cNvPr id="4" name="Content Placeholder 2">
             <a:extLst>
               <a:ext uri="{FF2B5EF4-FFF2-40B4-BE49-F238E27FC236}">
-                <a16:creationId xmlns:a16="http://schemas.microsoft.com/office/drawing/2014/main" id="{15E85D6C-29C2-0243-8BF9-BA6BE6CF64E4}"/>
+                <a16:creationId xmlns:a16="http://schemas.microsoft.com/office/drawing/2014/main" xmlns="" id="{15E85D6C-29C2-0243-8BF9-BA6BE6CF64E4}"/>
               </a:ext>
             </a:extLst>
           </p:cNvPr>
@@ -11117,7 +11152,7 @@
           <p:cNvPr id="2" name="Title 1">
             <a:extLst>
               <a:ext uri="{FF2B5EF4-FFF2-40B4-BE49-F238E27FC236}">
-                <a16:creationId xmlns:a16="http://schemas.microsoft.com/office/drawing/2014/main" id="{20D80D1A-A594-5669-E416-C9642DF22CB0}"/>
+                <a16:creationId xmlns:a16="http://schemas.microsoft.com/office/drawing/2014/main" xmlns="" id="{20D80D1A-A594-5669-E416-C9642DF22CB0}"/>
               </a:ext>
             </a:extLst>
           </p:cNvPr>
@@ -11145,7 +11180,7 @@
           <p:cNvPr id="3" name="Content Placeholder 2">
             <a:extLst>
               <a:ext uri="{FF2B5EF4-FFF2-40B4-BE49-F238E27FC236}">
-                <a16:creationId xmlns:a16="http://schemas.microsoft.com/office/drawing/2014/main" id="{6773AD86-58E4-7558-084E-5CB2AC5F07BC}"/>
+                <a16:creationId xmlns:a16="http://schemas.microsoft.com/office/drawing/2014/main" xmlns="" id="{6773AD86-58E4-7558-084E-5CB2AC5F07BC}"/>
               </a:ext>
             </a:extLst>
           </p:cNvPr>
@@ -11194,7 +11229,7 @@
           <p:cNvPr id="4" name="Picture 3">
             <a:extLst>
               <a:ext uri="{FF2B5EF4-FFF2-40B4-BE49-F238E27FC236}">
-                <a16:creationId xmlns:a16="http://schemas.microsoft.com/office/drawing/2014/main" id="{016F0068-3783-5A99-5992-CB3DAA88E7F7}"/>
+                <a16:creationId xmlns:a16="http://schemas.microsoft.com/office/drawing/2014/main" xmlns="" id="{016F0068-3783-5A99-5992-CB3DAA88E7F7}"/>
               </a:ext>
             </a:extLst>
           </p:cNvPr>
@@ -11223,7 +11258,7 @@
           <p:cNvPr id="5" name="Picture 4">
             <a:extLst>
               <a:ext uri="{FF2B5EF4-FFF2-40B4-BE49-F238E27FC236}">
-                <a16:creationId xmlns:a16="http://schemas.microsoft.com/office/drawing/2014/main" id="{C87720C6-82EF-7554-B437-F2CE3AEC8D81}"/>
+                <a16:creationId xmlns:a16="http://schemas.microsoft.com/office/drawing/2014/main" xmlns="" id="{C87720C6-82EF-7554-B437-F2CE3AEC8D81}"/>
               </a:ext>
             </a:extLst>
           </p:cNvPr>
@@ -11252,7 +11287,7 @@
           <p:cNvPr id="7" name="Rectangle: Rounded Corners 6">
             <a:extLst>
               <a:ext uri="{FF2B5EF4-FFF2-40B4-BE49-F238E27FC236}">
-                <a16:creationId xmlns:a16="http://schemas.microsoft.com/office/drawing/2014/main" id="{F449B456-9D34-A0BB-B9DE-C0917DAA7286}"/>
+                <a16:creationId xmlns:a16="http://schemas.microsoft.com/office/drawing/2014/main" xmlns="" id="{F449B456-9D34-A0BB-B9DE-C0917DAA7286}"/>
               </a:ext>
             </a:extLst>
           </p:cNvPr>
@@ -11298,7 +11333,7 @@
           <p:cNvPr id="10" name="Rectangle: Rounded Corners 9">
             <a:extLst>
               <a:ext uri="{FF2B5EF4-FFF2-40B4-BE49-F238E27FC236}">
-                <a16:creationId xmlns:a16="http://schemas.microsoft.com/office/drawing/2014/main" id="{D13021AC-EE1E-884D-D7D9-6C256A2645AE}"/>
+                <a16:creationId xmlns:a16="http://schemas.microsoft.com/office/drawing/2014/main" xmlns="" id="{D13021AC-EE1E-884D-D7D9-6C256A2645AE}"/>
               </a:ext>
             </a:extLst>
           </p:cNvPr>
@@ -11344,7 +11379,7 @@
           <p:cNvPr id="11" name="Picture 10">
             <a:extLst>
               <a:ext uri="{FF2B5EF4-FFF2-40B4-BE49-F238E27FC236}">
-                <a16:creationId xmlns:a16="http://schemas.microsoft.com/office/drawing/2014/main" id="{132EE006-40E4-9878-0146-98BE23FB4C2E}"/>
+                <a16:creationId xmlns:a16="http://schemas.microsoft.com/office/drawing/2014/main" xmlns="" id="{132EE006-40E4-9878-0146-98BE23FB4C2E}"/>
               </a:ext>
             </a:extLst>
           </p:cNvPr>
@@ -11374,7 +11409,7 @@
           <p:cNvPr id="12" name="Picture 11">
             <a:extLst>
               <a:ext uri="{FF2B5EF4-FFF2-40B4-BE49-F238E27FC236}">
-                <a16:creationId xmlns:a16="http://schemas.microsoft.com/office/drawing/2014/main" id="{9BA1B477-24F3-E5DF-12C2-6F791C1381B5}"/>
+                <a16:creationId xmlns:a16="http://schemas.microsoft.com/office/drawing/2014/main" xmlns="" id="{9BA1B477-24F3-E5DF-12C2-6F791C1381B5}"/>
               </a:ext>
             </a:extLst>
           </p:cNvPr>
@@ -11434,7 +11469,7 @@
           <p:cNvPr id="2" name="Title 1">
             <a:extLst>
               <a:ext uri="{FF2B5EF4-FFF2-40B4-BE49-F238E27FC236}">
-                <a16:creationId xmlns:a16="http://schemas.microsoft.com/office/drawing/2014/main" id="{1CFBD9DB-14C6-32F0-A8F6-789E2A36B5C5}"/>
+                <a16:creationId xmlns:a16="http://schemas.microsoft.com/office/drawing/2014/main" xmlns="" id="{1CFBD9DB-14C6-32F0-A8F6-789E2A36B5C5}"/>
               </a:ext>
             </a:extLst>
           </p:cNvPr>
@@ -11462,7 +11497,7 @@
           <p:cNvPr id="3" name="Content Placeholder 2">
             <a:extLst>
               <a:ext uri="{FF2B5EF4-FFF2-40B4-BE49-F238E27FC236}">
-                <a16:creationId xmlns:a16="http://schemas.microsoft.com/office/drawing/2014/main" id="{F3B6AF3C-5D56-2FFD-0306-1499AF960257}"/>
+                <a16:creationId xmlns:a16="http://schemas.microsoft.com/office/drawing/2014/main" xmlns="" id="{F3B6AF3C-5D56-2FFD-0306-1499AF960257}"/>
               </a:ext>
             </a:extLst>
           </p:cNvPr>
@@ -11517,7 +11552,7 @@
           <p:cNvPr id="5" name="Picture 4">
             <a:extLst>
               <a:ext uri="{FF2B5EF4-FFF2-40B4-BE49-F238E27FC236}">
-                <a16:creationId xmlns:a16="http://schemas.microsoft.com/office/drawing/2014/main" id="{2F40E2AA-2D4D-DBA9-2F8C-0569FA5F83A2}"/>
+                <a16:creationId xmlns:a16="http://schemas.microsoft.com/office/drawing/2014/main" xmlns="" id="{2F40E2AA-2D4D-DBA9-2F8C-0569FA5F83A2}"/>
               </a:ext>
             </a:extLst>
           </p:cNvPr>
@@ -11546,7 +11581,7 @@
           <p:cNvPr id="13" name="Picture 12">
             <a:extLst>
               <a:ext uri="{FF2B5EF4-FFF2-40B4-BE49-F238E27FC236}">
-                <a16:creationId xmlns:a16="http://schemas.microsoft.com/office/drawing/2014/main" id="{FDF5CAD4-58B9-E7F7-1622-602A5B730560}"/>
+                <a16:creationId xmlns:a16="http://schemas.microsoft.com/office/drawing/2014/main" xmlns="" id="{FDF5CAD4-58B9-E7F7-1622-602A5B730560}"/>
               </a:ext>
             </a:extLst>
           </p:cNvPr>
@@ -11576,7 +11611,7 @@
           <p:cNvPr id="11" name="Picture 10">
             <a:extLst>
               <a:ext uri="{FF2B5EF4-FFF2-40B4-BE49-F238E27FC236}">
-                <a16:creationId xmlns:a16="http://schemas.microsoft.com/office/drawing/2014/main" id="{C2308212-CCDD-6463-E0ED-61D392B84C24}"/>
+                <a16:creationId xmlns:a16="http://schemas.microsoft.com/office/drawing/2014/main" xmlns="" id="{C2308212-CCDD-6463-E0ED-61D392B84C24}"/>
               </a:ext>
             </a:extLst>
           </p:cNvPr>
@@ -11606,7 +11641,7 @@
           <p:cNvPr id="17" name="Group 16">
             <a:extLst>
               <a:ext uri="{FF2B5EF4-FFF2-40B4-BE49-F238E27FC236}">
-                <a16:creationId xmlns:a16="http://schemas.microsoft.com/office/drawing/2014/main" id="{1BB03DFC-38C8-C8D5-3F52-E9369FA3CD42}"/>
+                <a16:creationId xmlns:a16="http://schemas.microsoft.com/office/drawing/2014/main" xmlns="" id="{1BB03DFC-38C8-C8D5-3F52-E9369FA3CD42}"/>
               </a:ext>
             </a:extLst>
           </p:cNvPr>
@@ -11626,7 +11661,7 @@
             <p:cNvPr id="15" name="Picture 14" descr="A diagram of the brain&#10;&#10;Description automatically generated">
               <a:extLst>
                 <a:ext uri="{FF2B5EF4-FFF2-40B4-BE49-F238E27FC236}">
-                  <a16:creationId xmlns:a16="http://schemas.microsoft.com/office/drawing/2014/main" id="{B79EAAAF-AE28-60DA-2134-B6B1D3A8C853}"/>
+                  <a16:creationId xmlns:a16="http://schemas.microsoft.com/office/drawing/2014/main" xmlns="" id="{B79EAAAF-AE28-60DA-2134-B6B1D3A8C853}"/>
                 </a:ext>
               </a:extLst>
             </p:cNvPr>
@@ -11662,7 +11697,7 @@
             <p:cNvPr id="16" name="TextBox 15">
               <a:extLst>
                 <a:ext uri="{FF2B5EF4-FFF2-40B4-BE49-F238E27FC236}">
-                  <a16:creationId xmlns:a16="http://schemas.microsoft.com/office/drawing/2014/main" id="{05DEAEE7-9316-AD21-E136-46FB80692082}"/>
+                  <a16:creationId xmlns:a16="http://schemas.microsoft.com/office/drawing/2014/main" xmlns="" id="{05DEAEE7-9316-AD21-E136-46FB80692082}"/>
                 </a:ext>
               </a:extLst>
             </p:cNvPr>
@@ -11728,7 +11763,7 @@
           <p:cNvPr id="2" name="Title 1">
             <a:extLst>
               <a:ext uri="{FF2B5EF4-FFF2-40B4-BE49-F238E27FC236}">
-                <a16:creationId xmlns:a16="http://schemas.microsoft.com/office/drawing/2014/main" id="{2C32BD3F-A14B-37DB-561C-E3DF44882F48}"/>
+                <a16:creationId xmlns:a16="http://schemas.microsoft.com/office/drawing/2014/main" xmlns="" id="{2C32BD3F-A14B-37DB-561C-E3DF44882F48}"/>
               </a:ext>
             </a:extLst>
           </p:cNvPr>
@@ -11756,7 +11791,7 @@
           <p:cNvPr id="29" name="Picture 28">
             <a:extLst>
               <a:ext uri="{FF2B5EF4-FFF2-40B4-BE49-F238E27FC236}">
-                <a16:creationId xmlns:a16="http://schemas.microsoft.com/office/drawing/2014/main" id="{200314EF-3253-C2B0-2677-993BF1A2F53E}"/>
+                <a16:creationId xmlns:a16="http://schemas.microsoft.com/office/drawing/2014/main" xmlns="" id="{200314EF-3253-C2B0-2677-993BF1A2F53E}"/>
               </a:ext>
             </a:extLst>
           </p:cNvPr>
@@ -11786,7 +11821,7 @@
           <p:cNvPr id="4" name="Group 3">
             <a:extLst>
               <a:ext uri="{FF2B5EF4-FFF2-40B4-BE49-F238E27FC236}">
-                <a16:creationId xmlns:a16="http://schemas.microsoft.com/office/drawing/2014/main" id="{6FBF83D1-92E9-4862-B011-3ED331534BA4}"/>
+                <a16:creationId xmlns:a16="http://schemas.microsoft.com/office/drawing/2014/main" xmlns="" id="{6FBF83D1-92E9-4862-B011-3ED331534BA4}"/>
               </a:ext>
             </a:extLst>
           </p:cNvPr>
@@ -11806,7 +11841,7 @@
             <p:cNvPr id="5" name="Picture 4" descr="A graph of a graph of a graph&#10;&#10;Description automatically generated with medium confidence">
               <a:extLst>
                 <a:ext uri="{FF2B5EF4-FFF2-40B4-BE49-F238E27FC236}">
-                  <a16:creationId xmlns:a16="http://schemas.microsoft.com/office/drawing/2014/main" id="{6ADF9FBD-1701-AD5F-812B-8AB07728C23F}"/>
+                  <a16:creationId xmlns:a16="http://schemas.microsoft.com/office/drawing/2014/main" xmlns="" id="{6ADF9FBD-1701-AD5F-812B-8AB07728C23F}"/>
                 </a:ext>
               </a:extLst>
             </p:cNvPr>
@@ -11816,7 +11851,7 @@
             <p:nvPr/>
           </p:nvPicPr>
           <p:blipFill>
-            <a:blip r:embed="rId3">
+            <a:blip r:embed="rId3" cstate="print">
               <a:extLst>
                 <a:ext uri="{28A0092B-C50C-407E-A947-70E740481C1C}">
                   <a14:useLocalDpi xmlns:a14="http://schemas.microsoft.com/office/drawing/2010/main" val="0"/>
@@ -11842,7 +11877,7 @@
             <p:cNvPr id="6" name="TextBox 5">
               <a:extLst>
                 <a:ext uri="{FF2B5EF4-FFF2-40B4-BE49-F238E27FC236}">
-                  <a16:creationId xmlns:a16="http://schemas.microsoft.com/office/drawing/2014/main" id="{C7AD888C-2472-D0BC-059B-C36A484E71D0}"/>
+                  <a16:creationId xmlns:a16="http://schemas.microsoft.com/office/drawing/2014/main" xmlns="" id="{C7AD888C-2472-D0BC-059B-C36A484E71D0}"/>
                 </a:ext>
               </a:extLst>
             </p:cNvPr>
@@ -11908,7 +11943,7 @@
           <p:cNvPr id="2" name="Title 1">
             <a:extLst>
               <a:ext uri="{FF2B5EF4-FFF2-40B4-BE49-F238E27FC236}">
-                <a16:creationId xmlns:a16="http://schemas.microsoft.com/office/drawing/2014/main" id="{E71E46EB-F59D-1048-7DA2-08030DFB530C}"/>
+                <a16:creationId xmlns:a16="http://schemas.microsoft.com/office/drawing/2014/main" xmlns="" id="{E71E46EB-F59D-1048-7DA2-08030DFB530C}"/>
               </a:ext>
             </a:extLst>
           </p:cNvPr>
@@ -11936,7 +11971,7 @@
           <p:cNvPr id="3" name="Content Placeholder 2">
             <a:extLst>
               <a:ext uri="{FF2B5EF4-FFF2-40B4-BE49-F238E27FC236}">
-                <a16:creationId xmlns:a16="http://schemas.microsoft.com/office/drawing/2014/main" id="{DFAA6BFF-2ADC-C751-65E9-EA5EC84CC47D}"/>
+                <a16:creationId xmlns:a16="http://schemas.microsoft.com/office/drawing/2014/main" xmlns="" id="{DFAA6BFF-2ADC-C751-65E9-EA5EC84CC47D}"/>
               </a:ext>
             </a:extLst>
           </p:cNvPr>
@@ -11982,7 +12017,7 @@
           <p:cNvPr id="19" name="Picture 18">
             <a:extLst>
               <a:ext uri="{FF2B5EF4-FFF2-40B4-BE49-F238E27FC236}">
-                <a16:creationId xmlns:a16="http://schemas.microsoft.com/office/drawing/2014/main" id="{DC42B70B-F9AE-7780-00BA-A4365EC3C7EB}"/>
+                <a16:creationId xmlns:a16="http://schemas.microsoft.com/office/drawing/2014/main" xmlns="" id="{DC42B70B-F9AE-7780-00BA-A4365EC3C7EB}"/>
               </a:ext>
             </a:extLst>
           </p:cNvPr>
@@ -12012,7 +12047,7 @@
           <p:cNvPr id="33" name="Picture 32">
             <a:extLst>
               <a:ext uri="{FF2B5EF4-FFF2-40B4-BE49-F238E27FC236}">
-                <a16:creationId xmlns:a16="http://schemas.microsoft.com/office/drawing/2014/main" id="{C3B7C8EE-0590-D5E8-F60C-AAF4B239CB51}"/>
+                <a16:creationId xmlns:a16="http://schemas.microsoft.com/office/drawing/2014/main" xmlns="" id="{C3B7C8EE-0590-D5E8-F60C-AAF4B239CB51}"/>
               </a:ext>
             </a:extLst>
           </p:cNvPr>
@@ -12042,7 +12077,7 @@
           <p:cNvPr id="39" name="Group 38">
             <a:extLst>
               <a:ext uri="{FF2B5EF4-FFF2-40B4-BE49-F238E27FC236}">
-                <a16:creationId xmlns:a16="http://schemas.microsoft.com/office/drawing/2014/main" id="{45168ED9-6528-EA09-F3C7-EF24700FEA2C}"/>
+                <a16:creationId xmlns:a16="http://schemas.microsoft.com/office/drawing/2014/main" xmlns="" id="{45168ED9-6528-EA09-F3C7-EF24700FEA2C}"/>
               </a:ext>
             </a:extLst>
           </p:cNvPr>
@@ -12062,7 +12097,7 @@
             <p:cNvPr id="10" name="Picture 9">
               <a:extLst>
                 <a:ext uri="{FF2B5EF4-FFF2-40B4-BE49-F238E27FC236}">
-                  <a16:creationId xmlns:a16="http://schemas.microsoft.com/office/drawing/2014/main" id="{78E5A823-CF91-898D-E7BF-397D7EA52C0D}"/>
+                  <a16:creationId xmlns:a16="http://schemas.microsoft.com/office/drawing/2014/main" xmlns="" id="{78E5A823-CF91-898D-E7BF-397D7EA52C0D}"/>
                 </a:ext>
               </a:extLst>
             </p:cNvPr>
@@ -12092,7 +12127,7 @@
             <p:cNvPr id="38" name="Group 37">
               <a:extLst>
                 <a:ext uri="{FF2B5EF4-FFF2-40B4-BE49-F238E27FC236}">
-                  <a16:creationId xmlns:a16="http://schemas.microsoft.com/office/drawing/2014/main" id="{322235E3-0F16-56AA-51D3-BB93E0E7D352}"/>
+                  <a16:creationId xmlns:a16="http://schemas.microsoft.com/office/drawing/2014/main" xmlns="" id="{322235E3-0F16-56AA-51D3-BB93E0E7D352}"/>
                 </a:ext>
               </a:extLst>
             </p:cNvPr>
@@ -12112,7 +12147,7 @@
               <p:cNvPr id="20" name="Rectangle: Rounded Corners 19">
                 <a:extLst>
                   <a:ext uri="{FF2B5EF4-FFF2-40B4-BE49-F238E27FC236}">
-                    <a16:creationId xmlns:a16="http://schemas.microsoft.com/office/drawing/2014/main" id="{49B357E7-D380-056A-30E0-1CCFACAA3B78}"/>
+                    <a16:creationId xmlns:a16="http://schemas.microsoft.com/office/drawing/2014/main" xmlns="" id="{49B357E7-D380-056A-30E0-1CCFACAA3B78}"/>
                   </a:ext>
                 </a:extLst>
               </p:cNvPr>
@@ -12158,7 +12193,7 @@
               <p:cNvPr id="37" name="Straight Arrow Connector 36">
                 <a:extLst>
                   <a:ext uri="{FF2B5EF4-FFF2-40B4-BE49-F238E27FC236}">
-                    <a16:creationId xmlns:a16="http://schemas.microsoft.com/office/drawing/2014/main" id="{11537CA5-AC73-8B95-920B-83ABD4FAA490}"/>
+                    <a16:creationId xmlns:a16="http://schemas.microsoft.com/office/drawing/2014/main" xmlns="" id="{11537CA5-AC73-8B95-920B-83ABD4FAA490}"/>
                   </a:ext>
                 </a:extLst>
               </p:cNvPr>
@@ -12202,7 +12237,7 @@
           <p:cNvPr id="45" name="Group 44">
             <a:extLst>
               <a:ext uri="{FF2B5EF4-FFF2-40B4-BE49-F238E27FC236}">
-                <a16:creationId xmlns:a16="http://schemas.microsoft.com/office/drawing/2014/main" id="{D579C0A4-9309-9663-6253-81ED8DE8B242}"/>
+                <a16:creationId xmlns:a16="http://schemas.microsoft.com/office/drawing/2014/main" xmlns="" id="{D579C0A4-9309-9663-6253-81ED8DE8B242}"/>
               </a:ext>
             </a:extLst>
           </p:cNvPr>
@@ -12222,7 +12257,7 @@
             <p:cNvPr id="17" name="Group 16">
               <a:extLst>
                 <a:ext uri="{FF2B5EF4-FFF2-40B4-BE49-F238E27FC236}">
-                  <a16:creationId xmlns:a16="http://schemas.microsoft.com/office/drawing/2014/main" id="{D8CAB7C4-04DB-FE76-7161-8A06B29F1201}"/>
+                  <a16:creationId xmlns:a16="http://schemas.microsoft.com/office/drawing/2014/main" xmlns="" id="{D8CAB7C4-04DB-FE76-7161-8A06B29F1201}"/>
                 </a:ext>
               </a:extLst>
             </p:cNvPr>
@@ -12242,7 +12277,7 @@
               <p:cNvPr id="15" name="Group 14">
                 <a:extLst>
                   <a:ext uri="{FF2B5EF4-FFF2-40B4-BE49-F238E27FC236}">
-                    <a16:creationId xmlns:a16="http://schemas.microsoft.com/office/drawing/2014/main" id="{FD234A33-A4D4-954A-DA0E-9B4F0A89A932}"/>
+                    <a16:creationId xmlns:a16="http://schemas.microsoft.com/office/drawing/2014/main" xmlns="" id="{FD234A33-A4D4-954A-DA0E-9B4F0A89A932}"/>
                   </a:ext>
                 </a:extLst>
               </p:cNvPr>
@@ -12262,7 +12297,7 @@
                 <p:cNvPr id="12" name="Picture 11" descr="A drawing of a lemon&#10;&#10;Description automatically generated">
                   <a:extLst>
                     <a:ext uri="{FF2B5EF4-FFF2-40B4-BE49-F238E27FC236}">
-                      <a16:creationId xmlns:a16="http://schemas.microsoft.com/office/drawing/2014/main" id="{5CEA78EA-3941-6B38-1D1D-D77A44E02979}"/>
+                      <a16:creationId xmlns:a16="http://schemas.microsoft.com/office/drawing/2014/main" xmlns="" id="{5CEA78EA-3941-6B38-1D1D-D77A44E02979}"/>
                     </a:ext>
                   </a:extLst>
                 </p:cNvPr>
@@ -12298,7 +12333,7 @@
                 <p:cNvPr id="14" name="Picture 13">
                   <a:extLst>
                     <a:ext uri="{FF2B5EF4-FFF2-40B4-BE49-F238E27FC236}">
-                      <a16:creationId xmlns:a16="http://schemas.microsoft.com/office/drawing/2014/main" id="{229949F5-9B07-0506-4A1A-E744EF330E30}"/>
+                      <a16:creationId xmlns:a16="http://schemas.microsoft.com/office/drawing/2014/main" xmlns="" id="{229949F5-9B07-0506-4A1A-E744EF330E30}"/>
                     </a:ext>
                   </a:extLst>
                 </p:cNvPr>
@@ -12329,7 +12364,7 @@
               <p:cNvPr id="16" name="TextBox 15">
                 <a:extLst>
                   <a:ext uri="{FF2B5EF4-FFF2-40B4-BE49-F238E27FC236}">
-                    <a16:creationId xmlns:a16="http://schemas.microsoft.com/office/drawing/2014/main" id="{640931C8-F655-5023-850C-29F1A52E466D}"/>
+                    <a16:creationId xmlns:a16="http://schemas.microsoft.com/office/drawing/2014/main" xmlns="" id="{640931C8-F655-5023-850C-29F1A52E466D}"/>
                   </a:ext>
                 </a:extLst>
               </p:cNvPr>
@@ -12365,7 +12400,7 @@
             <p:cNvPr id="41" name="Rectangle: Rounded Corners 40">
               <a:extLst>
                 <a:ext uri="{FF2B5EF4-FFF2-40B4-BE49-F238E27FC236}">
-                  <a16:creationId xmlns:a16="http://schemas.microsoft.com/office/drawing/2014/main" id="{C3B8B2EF-E0DB-CCD4-8109-14A45F7B97FD}"/>
+                  <a16:creationId xmlns:a16="http://schemas.microsoft.com/office/drawing/2014/main" xmlns="" id="{C3B8B2EF-E0DB-CCD4-8109-14A45F7B97FD}"/>
                 </a:ext>
               </a:extLst>
             </p:cNvPr>
@@ -12412,7 +12447,7 @@
           <p:cNvPr id="42" name="Straight Arrow Connector 41">
             <a:extLst>
               <a:ext uri="{FF2B5EF4-FFF2-40B4-BE49-F238E27FC236}">
-                <a16:creationId xmlns:a16="http://schemas.microsoft.com/office/drawing/2014/main" id="{FD231946-5464-7C50-5784-0AF5BDCFFA34}"/>
+                <a16:creationId xmlns:a16="http://schemas.microsoft.com/office/drawing/2014/main" xmlns="" id="{FD231946-5464-7C50-5784-0AF5BDCFFA34}"/>
               </a:ext>
             </a:extLst>
           </p:cNvPr>
@@ -12455,7 +12490,7 @@
           <p:cNvPr id="46" name="Straight Arrow Connector 45">
             <a:extLst>
               <a:ext uri="{FF2B5EF4-FFF2-40B4-BE49-F238E27FC236}">
-                <a16:creationId xmlns:a16="http://schemas.microsoft.com/office/drawing/2014/main" id="{9EE46402-329E-AAEC-7D29-311025721A2C}"/>
+                <a16:creationId xmlns:a16="http://schemas.microsoft.com/office/drawing/2014/main" xmlns="" id="{9EE46402-329E-AAEC-7D29-311025721A2C}"/>
               </a:ext>
             </a:extLst>
           </p:cNvPr>
@@ -12497,7 +12532,7 @@
           <p:cNvPr id="53" name="Group 52">
             <a:extLst>
               <a:ext uri="{FF2B5EF4-FFF2-40B4-BE49-F238E27FC236}">
-                <a16:creationId xmlns:a16="http://schemas.microsoft.com/office/drawing/2014/main" id="{0CF8C890-7DCE-E09E-A3D8-2B7F0865B74E}"/>
+                <a16:creationId xmlns:a16="http://schemas.microsoft.com/office/drawing/2014/main" xmlns="" id="{0CF8C890-7DCE-E09E-A3D8-2B7F0865B74E}"/>
               </a:ext>
             </a:extLst>
           </p:cNvPr>
@@ -12517,7 +12552,7 @@
             <p:cNvPr id="51" name="Rectangle: Rounded Corners 50">
               <a:extLst>
                 <a:ext uri="{FF2B5EF4-FFF2-40B4-BE49-F238E27FC236}">
-                  <a16:creationId xmlns:a16="http://schemas.microsoft.com/office/drawing/2014/main" id="{49B7FCA9-F1F0-CCA4-7793-C33B500BACE5}"/>
+                  <a16:creationId xmlns:a16="http://schemas.microsoft.com/office/drawing/2014/main" xmlns="" id="{49B7FCA9-F1F0-CCA4-7793-C33B500BACE5}"/>
                 </a:ext>
               </a:extLst>
             </p:cNvPr>
@@ -12563,7 +12598,7 @@
             <p:cNvPr id="52" name="Rectangle: Rounded Corners 51">
               <a:extLst>
                 <a:ext uri="{FF2B5EF4-FFF2-40B4-BE49-F238E27FC236}">
-                  <a16:creationId xmlns:a16="http://schemas.microsoft.com/office/drawing/2014/main" id="{3D86254B-7409-0937-590D-6DA5C98E8ADE}"/>
+                  <a16:creationId xmlns:a16="http://schemas.microsoft.com/office/drawing/2014/main" xmlns="" id="{3D86254B-7409-0937-590D-6DA5C98E8ADE}"/>
                 </a:ext>
               </a:extLst>
             </p:cNvPr>
@@ -12661,7 +12696,7 @@
     </a:clrScheme>
     <a:fontScheme name="Office">
       <a:majorFont>
-        <a:latin typeface="Calibri Light" panose="020F0302020204030204"/>
+        <a:latin typeface="Calibri Light"/>
         <a:ea typeface=""/>
         <a:cs typeface=""/>
         <a:font script="Jpan" typeface="游ゴシック Light"/>
@@ -12713,7 +12748,7 @@
         <a:font script="Tfng" typeface="Ebrima"/>
       </a:majorFont>
       <a:minorFont>
-        <a:latin typeface="Calibri" panose="020F0502020204030204"/>
+        <a:latin typeface="Calibri"/>
         <a:ea typeface=""/>
         <a:cs typeface=""/>
         <a:font script="Jpan" typeface="游ゴシック"/>
@@ -12907,7 +12942,7 @@
   <a:extraClrSchemeLst/>
   <a:extLst>
     <a:ext uri="{05A4C25C-085E-4340-85A3-A5531E510DB2}">
-      <thm15:themeFamily xmlns:thm15="http://schemas.microsoft.com/office/thememl/2012/main" name="Office Theme" id="{62F939B6-93AF-4DB8-9C6B-D6C7DFDC589F}" vid="{4A3C46E8-61CC-4603-A589-7422A47A8E4A}"/>
+      <thm15:themeFamily xmlns:thm15="http://schemas.microsoft.com/office/thememl/2012/main" xmlns="" name="Office Theme" id="{62F939B6-93AF-4DB8-9C6B-D6C7DFDC589F}" vid="{4A3C46E8-61CC-4603-A589-7422A47A8E4A}"/>
     </a:ext>
   </a:extLst>
 </a:theme>

</xml_diff>